<commit_message>
Reordered slides, updated slides, corrected typos
</commit_message>
<xml_diff>
--- a/LectureSlides/11_PropertiesOfTimeSeries.pptx
+++ b/LectureSlides/11_PropertiesOfTimeSeries.pptx
@@ -38,9 +38,9 @@
     <p:sldId id="284" r:id="rId32"/>
     <p:sldId id="325" r:id="rId33"/>
     <p:sldId id="285" r:id="rId34"/>
-    <p:sldId id="288" r:id="rId35"/>
-    <p:sldId id="287" r:id="rId36"/>
-    <p:sldId id="330" r:id="rId37"/>
+    <p:sldId id="330" r:id="rId35"/>
+    <p:sldId id="288" r:id="rId36"/>
+    <p:sldId id="287" r:id="rId37"/>
     <p:sldId id="286" r:id="rId38"/>
     <p:sldId id="326" r:id="rId39"/>
     <p:sldId id="289" r:id="rId40"/>
@@ -372,7 +372,7 @@
           <a:p>
             <a:fld id="{241EB5C9-1307-BA42-ABA2-0BC069CD8E7F}" type="datetimeFigureOut">
               <a:rPr lang="en-US" smtClean="0"/>
-              <a:t>10/21/2025</a:t>
+              <a:t>10/22/2025</a:t>
             </a:fld>
             <a:endParaRPr lang="en-US"/>
           </a:p>
@@ -540,7 +540,7 @@
           <a:p>
             <a:fld id="{241EB5C9-1307-BA42-ABA2-0BC069CD8E7F}" type="datetimeFigureOut">
               <a:rPr lang="en-US" smtClean="0"/>
-              <a:t>10/21/2025</a:t>
+              <a:t>10/22/2025</a:t>
             </a:fld>
             <a:endParaRPr lang="en-US"/>
           </a:p>
@@ -718,7 +718,7 @@
           <a:p>
             <a:fld id="{241EB5C9-1307-BA42-ABA2-0BC069CD8E7F}" type="datetimeFigureOut">
               <a:rPr lang="en-US" smtClean="0"/>
-              <a:t>10/21/2025</a:t>
+              <a:t>10/22/2025</a:t>
             </a:fld>
             <a:endParaRPr lang="en-US"/>
           </a:p>
@@ -886,7 +886,7 @@
           <a:p>
             <a:fld id="{241EB5C9-1307-BA42-ABA2-0BC069CD8E7F}" type="datetimeFigureOut">
               <a:rPr lang="en-US" smtClean="0"/>
-              <a:t>10/21/2025</a:t>
+              <a:t>10/22/2025</a:t>
             </a:fld>
             <a:endParaRPr lang="en-US"/>
           </a:p>
@@ -1131,7 +1131,7 @@
           <a:p>
             <a:fld id="{241EB5C9-1307-BA42-ABA2-0BC069CD8E7F}" type="datetimeFigureOut">
               <a:rPr lang="en-US" smtClean="0"/>
-              <a:t>10/21/2025</a:t>
+              <a:t>10/22/2025</a:t>
             </a:fld>
             <a:endParaRPr lang="en-US"/>
           </a:p>
@@ -1416,7 +1416,7 @@
           <a:p>
             <a:fld id="{241EB5C9-1307-BA42-ABA2-0BC069CD8E7F}" type="datetimeFigureOut">
               <a:rPr lang="en-US" smtClean="0"/>
-              <a:t>10/21/2025</a:t>
+              <a:t>10/22/2025</a:t>
             </a:fld>
             <a:endParaRPr lang="en-US"/>
           </a:p>
@@ -1835,7 +1835,7 @@
           <a:p>
             <a:fld id="{241EB5C9-1307-BA42-ABA2-0BC069CD8E7F}" type="datetimeFigureOut">
               <a:rPr lang="en-US" smtClean="0"/>
-              <a:t>10/21/2025</a:t>
+              <a:t>10/22/2025</a:t>
             </a:fld>
             <a:endParaRPr lang="en-US"/>
           </a:p>
@@ -1952,7 +1952,7 @@
           <a:p>
             <a:fld id="{241EB5C9-1307-BA42-ABA2-0BC069CD8E7F}" type="datetimeFigureOut">
               <a:rPr lang="en-US" smtClean="0"/>
-              <a:t>10/21/2025</a:t>
+              <a:t>10/22/2025</a:t>
             </a:fld>
             <a:endParaRPr lang="en-US"/>
           </a:p>
@@ -2047,7 +2047,7 @@
           <a:p>
             <a:fld id="{241EB5C9-1307-BA42-ABA2-0BC069CD8E7F}" type="datetimeFigureOut">
               <a:rPr lang="en-US" smtClean="0"/>
-              <a:t>10/21/2025</a:t>
+              <a:t>10/22/2025</a:t>
             </a:fld>
             <a:endParaRPr lang="en-US"/>
           </a:p>
@@ -2322,7 +2322,7 @@
           <a:p>
             <a:fld id="{241EB5C9-1307-BA42-ABA2-0BC069CD8E7F}" type="datetimeFigureOut">
               <a:rPr lang="en-US" smtClean="0"/>
-              <a:t>10/21/2025</a:t>
+              <a:t>10/22/2025</a:t>
             </a:fld>
             <a:endParaRPr lang="en-US"/>
           </a:p>
@@ -2574,7 +2574,7 @@
           <a:p>
             <a:fld id="{241EB5C9-1307-BA42-ABA2-0BC069CD8E7F}" type="datetimeFigureOut">
               <a:rPr lang="en-US" smtClean="0"/>
-              <a:t>10/21/2025</a:t>
+              <a:t>10/22/2025</a:t>
             </a:fld>
             <a:endParaRPr lang="en-US"/>
           </a:p>
@@ -2785,7 +2785,7 @@
           <a:p>
             <a:fld id="{241EB5C9-1307-BA42-ABA2-0BC069CD8E7F}" type="datetimeFigureOut">
               <a:rPr lang="en-US" smtClean="0"/>
-              <a:t>10/21/2025</a:t>
+              <a:t>10/22/2025</a:t>
             </a:fld>
             <a:endParaRPr lang="en-US"/>
           </a:p>
@@ -5616,8 +5616,8 @@
           </a:p>
         </p:txBody>
       </p:sp>
-      <mc:AlternateContent xmlns:mc="http://schemas.openxmlformats.org/markup-compatibility/2006">
-        <mc:Choice xmlns:a14="http://schemas.microsoft.com/office/drawing/2010/main" Requires="a14">
+      <mc:AlternateContent xmlns:mc="http://schemas.openxmlformats.org/markup-compatibility/2006" xmlns:a14="http://schemas.microsoft.com/office/drawing/2010/main">
+        <mc:Choice Requires="a14">
           <p:sp>
             <p:nvSpPr>
               <p:cNvPr id="3" name="Content Placeholder 2"/>
@@ -6181,7 +6181,7 @@
             </p:txBody>
           </p:sp>
         </mc:Choice>
-        <mc:Fallback>
+        <mc:Fallback xmlns="">
           <p:sp>
             <p:nvSpPr>
               <p:cNvPr id="3" name="Content Placeholder 2"/>
@@ -6917,8 +6917,8 @@
           </a:p>
         </p:txBody>
       </p:sp>
-      <mc:AlternateContent xmlns:mc="http://schemas.openxmlformats.org/markup-compatibility/2006">
-        <mc:Choice xmlns:a14="http://schemas.microsoft.com/office/drawing/2010/main" Requires="a14">
+      <mc:AlternateContent xmlns:mc="http://schemas.openxmlformats.org/markup-compatibility/2006" xmlns:a14="http://schemas.microsoft.com/office/drawing/2010/main">
+        <mc:Choice Requires="a14">
           <p:sp>
             <p:nvSpPr>
               <p:cNvPr id="4" name="Text Placeholder 3"/>
@@ -7070,7 +7070,7 @@
             </p:txBody>
           </p:sp>
         </mc:Choice>
-        <mc:Fallback>
+        <mc:Fallback xmlns="">
           <p:sp>
             <p:nvSpPr>
               <p:cNvPr id="4" name="Text Placeholder 3"/>
@@ -8296,8 +8296,8 @@
           </a:p>
         </p:txBody>
       </p:sp>
-      <mc:AlternateContent xmlns:mc="http://schemas.openxmlformats.org/markup-compatibility/2006">
-        <mc:Choice xmlns:a14="http://schemas.microsoft.com/office/drawing/2010/main" Requires="a14">
+      <mc:AlternateContent xmlns:mc="http://schemas.openxmlformats.org/markup-compatibility/2006" xmlns:a14="http://schemas.microsoft.com/office/drawing/2010/main">
+        <mc:Choice Requires="a14">
           <p:sp>
             <p:nvSpPr>
               <p:cNvPr id="3" name="Content Placeholder 2"/>
@@ -9179,7 +9179,7 @@
             </p:txBody>
           </p:sp>
         </mc:Choice>
-        <mc:Fallback>
+        <mc:Fallback xmlns="">
           <p:sp>
             <p:nvSpPr>
               <p:cNvPr id="3" name="Content Placeholder 2"/>
@@ -9396,8 +9396,8 @@
           </a:p>
         </p:txBody>
       </p:sp>
-      <mc:AlternateContent xmlns:mc="http://schemas.openxmlformats.org/markup-compatibility/2006">
-        <mc:Choice xmlns:a14="http://schemas.microsoft.com/office/drawing/2010/main" Requires="a14">
+      <mc:AlternateContent xmlns:mc="http://schemas.openxmlformats.org/markup-compatibility/2006" xmlns:a14="http://schemas.microsoft.com/office/drawing/2010/main">
+        <mc:Choice Requires="a14">
           <p:sp>
             <p:nvSpPr>
               <p:cNvPr id="3" name="Content Placeholder 2"/>
@@ -9553,7 +9553,7 @@
             </p:txBody>
           </p:sp>
         </mc:Choice>
-        <mc:Fallback>
+        <mc:Fallback xmlns="">
           <p:sp>
             <p:nvSpPr>
               <p:cNvPr id="3" name="Content Placeholder 2"/>
@@ -10338,8 +10338,8 @@
           </a:p>
         </p:txBody>
       </p:sp>
-      <mc:AlternateContent xmlns:mc="http://schemas.openxmlformats.org/markup-compatibility/2006">
-        <mc:Choice xmlns:a14="http://schemas.microsoft.com/office/drawing/2010/main" Requires="a14">
+      <mc:AlternateContent xmlns:mc="http://schemas.openxmlformats.org/markup-compatibility/2006" xmlns:a14="http://schemas.microsoft.com/office/drawing/2010/main">
+        <mc:Choice Requires="a14">
           <p:sp>
             <p:nvSpPr>
               <p:cNvPr id="3" name="Content Placeholder 2"/>
@@ -10710,7 +10710,7 @@
             </p:txBody>
           </p:sp>
         </mc:Choice>
-        <mc:Fallback>
+        <mc:Fallback xmlns="">
           <p:sp>
             <p:nvSpPr>
               <p:cNvPr id="3" name="Content Placeholder 2"/>
@@ -11179,8 +11179,8 @@
           </a:p>
         </p:txBody>
       </p:sp>
-      <mc:AlternateContent xmlns:mc="http://schemas.openxmlformats.org/markup-compatibility/2006">
-        <mc:Choice xmlns:a14="http://schemas.microsoft.com/office/drawing/2010/main" Requires="a14">
+      <mc:AlternateContent xmlns:mc="http://schemas.openxmlformats.org/markup-compatibility/2006" xmlns:a14="http://schemas.microsoft.com/office/drawing/2010/main">
+        <mc:Choice Requires="a14">
           <p:sp>
             <p:nvSpPr>
               <p:cNvPr id="3" name="Content Placeholder 2"/>
@@ -11717,7 +11717,6 @@
                 <a:endParaRPr lang="en-US" dirty="0"/>
               </a:p>
               <a:p>
-                <a:pPr/>
                 <a:r>
                   <a:rPr lang="en-US" dirty="0"/>
                   <a:t>We say that a random walk as an </a:t>
@@ -11731,7 +11730,7 @@
             </p:txBody>
           </p:sp>
         </mc:Choice>
-        <mc:Fallback>
+        <mc:Fallback xmlns="">
           <p:sp>
             <p:nvSpPr>
               <p:cNvPr id="3" name="Content Placeholder 2"/>
@@ -12137,8 +12136,8 @@
           </a:p>
         </p:txBody>
       </p:sp>
-      <mc:AlternateContent xmlns:mc="http://schemas.openxmlformats.org/markup-compatibility/2006">
-        <mc:Choice xmlns:a14="http://schemas.microsoft.com/office/drawing/2010/main" Requires="a14">
+      <mc:AlternateContent xmlns:mc="http://schemas.openxmlformats.org/markup-compatibility/2006" xmlns:a14="http://schemas.microsoft.com/office/drawing/2010/main">
+        <mc:Choice Requires="a14">
           <p:sp>
             <p:nvSpPr>
               <p:cNvPr id="3" name="Content Placeholder 2"/>
@@ -12526,7 +12525,7 @@
             </p:txBody>
           </p:sp>
         </mc:Choice>
-        <mc:Fallback>
+        <mc:Fallback xmlns="">
           <p:sp>
             <p:nvSpPr>
               <p:cNvPr id="3" name="Content Placeholder 2"/>
@@ -13646,8 +13645,8 @@
           </a:p>
         </p:txBody>
       </p:sp>
-      <mc:AlternateContent xmlns:mc="http://schemas.openxmlformats.org/markup-compatibility/2006">
-        <mc:Choice xmlns:a14="http://schemas.microsoft.com/office/drawing/2010/main" Requires="a14">
+      <mc:AlternateContent xmlns:mc="http://schemas.openxmlformats.org/markup-compatibility/2006" xmlns:a14="http://schemas.microsoft.com/office/drawing/2010/main">
+        <mc:Choice Requires="a14">
           <p:sp>
             <p:nvSpPr>
               <p:cNvPr id="4" name="Text Placeholder 3"/>
@@ -13725,7 +13724,7 @@
             </p:txBody>
           </p:sp>
         </mc:Choice>
-        <mc:Fallback>
+        <mc:Fallback xmlns="">
           <p:sp>
             <p:nvSpPr>
               <p:cNvPr id="4" name="Text Placeholder 3"/>
@@ -14475,8 +14474,8 @@
           </a:p>
         </p:txBody>
       </p:sp>
-      <mc:AlternateContent xmlns:mc="http://schemas.openxmlformats.org/markup-compatibility/2006">
-        <mc:Choice xmlns:a14="http://schemas.microsoft.com/office/drawing/2010/main" Requires="a14">
+      <mc:AlternateContent xmlns:mc="http://schemas.openxmlformats.org/markup-compatibility/2006" xmlns:a14="http://schemas.microsoft.com/office/drawing/2010/main">
+        <mc:Choice Requires="a14">
           <p:sp>
             <p:nvSpPr>
               <p:cNvPr id="4" name="Text Placeholder 3"/>
@@ -14797,7 +14796,7 @@
             </p:txBody>
           </p:sp>
         </mc:Choice>
-        <mc:Fallback>
+        <mc:Fallback xmlns="">
           <p:sp>
             <p:nvSpPr>
               <p:cNvPr id="4" name="Text Placeholder 3"/>
@@ -16191,762 +16190,6 @@
   <p:cSld>
     <p:spTree>
       <p:nvGrpSpPr>
-        <p:cNvPr id="1" name=""/>
-        <p:cNvGrpSpPr/>
-        <p:nvPr/>
-      </p:nvGrpSpPr>
-      <p:grpSpPr>
-        <a:xfrm>
-          <a:off x="0" y="0"/>
-          <a:ext cx="0" cy="0"/>
-          <a:chOff x="0" y="0"/>
-          <a:chExt cx="0" cy="0"/>
-        </a:xfrm>
-      </p:grpSpPr>
-      <p:sp>
-        <p:nvSpPr>
-          <p:cNvPr id="2" name="Title 1"/>
-          <p:cNvSpPr>
-            <a:spLocks noGrp="1"/>
-          </p:cNvSpPr>
-          <p:nvPr>
-            <p:ph type="title"/>
-          </p:nvPr>
-        </p:nvSpPr>
-        <p:spPr>
-          <a:xfrm>
-            <a:off x="457200" y="204787"/>
-            <a:ext cx="8325195" cy="672206"/>
-          </a:xfrm>
-        </p:spPr>
-        <p:txBody>
-          <a:bodyPr>
-            <a:normAutofit/>
-          </a:bodyPr>
-          <a:lstStyle/>
-          <a:p>
-            <a:pPr marL="0" lvl="0" indent="0" algn="ctr">
-              <a:buNone/>
-            </a:pPr>
-            <a:r>
-              <a:rPr sz="3200" b="0" dirty="0"/>
-              <a:t>Time Series With Trend</a:t>
-            </a:r>
-          </a:p>
-        </p:txBody>
-      </p:sp>
-      <p:sp>
-        <p:nvSpPr>
-          <p:cNvPr id="4" name="Text Placeholder 3"/>
-          <p:cNvSpPr>
-            <a:spLocks noGrp="1"/>
-          </p:cNvSpPr>
-          <p:nvPr>
-            <p:ph type="body" sz="half" idx="2"/>
-          </p:nvPr>
-        </p:nvSpPr>
-        <p:spPr>
-          <a:xfrm>
-            <a:off x="457201" y="1076326"/>
-            <a:ext cx="4804755" cy="3518297"/>
-          </a:xfrm>
-        </p:spPr>
-        <p:txBody>
-          <a:bodyPr>
-            <a:normAutofit/>
-          </a:bodyPr>
-          <a:lstStyle/>
-          <a:p>
-            <a:pPr marL="0" lvl="0" indent="0">
-              <a:buNone/>
-            </a:pPr>
-            <a:r>
-              <a:rPr sz="2000" dirty="0"/>
-              <a:t>ACF and PACF are only properly defined for stationary series</a:t>
-            </a:r>
-          </a:p>
-          <a:p>
-            <a:pPr marL="342900" lvl="0" indent="-342900">
-              <a:buFont typeface="Arial" panose="020B0604020202020204" pitchFamily="34" charset="0"/>
-              <a:buChar char="•"/>
-            </a:pPr>
-            <a:r>
-              <a:rPr sz="2000" dirty="0"/>
-              <a:t>For non-stationary series, the ACF dies off slowly</a:t>
-            </a:r>
-          </a:p>
-          <a:p>
-            <a:pPr marL="342900" indent="-342900">
-              <a:buFont typeface="Arial" panose="020B0604020202020204" pitchFamily="34" charset="0"/>
-              <a:buChar char="•"/>
-            </a:pPr>
-            <a:r>
-              <a:rPr sz="2150" dirty="0"/>
-              <a:t>Integrating innovations leads to </a:t>
-            </a:r>
-            <a:r>
-              <a:rPr sz="2150" b="1" dirty="0"/>
-              <a:t>long-term dependency</a:t>
-            </a:r>
-          </a:p>
-          <a:p>
-            <a:pPr marL="342900" lvl="0" indent="-342900">
-              <a:buFont typeface="Arial" panose="020B0604020202020204" pitchFamily="34" charset="0"/>
-              <a:buChar char="•"/>
-            </a:pPr>
-            <a:r>
-              <a:rPr sz="2000" dirty="0"/>
-              <a:t>The PACF dies off quickly with lag</a:t>
-            </a:r>
-            <a:r>
-              <a:rPr lang="en-US" sz="2000" dirty="0"/>
-              <a:t>, but generally slower than random walk</a:t>
-            </a:r>
-            <a:endParaRPr sz="2000" dirty="0"/>
-          </a:p>
-          <a:p>
-            <a:pPr marL="342900" lvl="0" indent="-342900">
-              <a:buFont typeface="Arial" panose="020B0604020202020204" pitchFamily="34" charset="0"/>
-              <a:buChar char="•"/>
-            </a:pPr>
-            <a:r>
-              <a:rPr sz="2000" dirty="0"/>
-              <a:t>Example: ACF and PACF of the white noise series with trend</a:t>
-            </a:r>
-          </a:p>
-        </p:txBody>
-      </p:sp>
-      <p:pic>
-        <p:nvPicPr>
-          <p:cNvPr id="6" name="Picture 5">
-            <a:extLst>
-              <a:ext uri="{FF2B5EF4-FFF2-40B4-BE49-F238E27FC236}">
-                <a16:creationId xmlns:a16="http://schemas.microsoft.com/office/drawing/2014/main" id="{3D057999-4447-A214-3501-C78BCAE43216}"/>
-              </a:ext>
-            </a:extLst>
-          </p:cNvPr>
-          <p:cNvPicPr>
-            <a:picLocks noChangeAspect="1"/>
-          </p:cNvPicPr>
-          <p:nvPr/>
-        </p:nvPicPr>
-        <p:blipFill>
-          <a:blip r:embed="rId2"/>
-          <a:stretch>
-            <a:fillRect/>
-          </a:stretch>
-        </p:blipFill>
-        <p:spPr>
-          <a:xfrm>
-            <a:off x="5428773" y="1473496"/>
-            <a:ext cx="3598643" cy="3518297"/>
-          </a:xfrm>
-          <a:prstGeom prst="rect">
-            <a:avLst/>
-          </a:prstGeom>
-        </p:spPr>
-      </p:pic>
-    </p:spTree>
-  </p:cSld>
-  <p:clrMapOvr>
-    <a:masterClrMapping/>
-  </p:clrMapOvr>
-  <p:timing>
-    <p:tnLst>
-      <p:par>
-        <p:cTn id="1" dur="indefinite" restart="never" nodeType="tmRoot">
-          <p:childTnLst>
-            <p:seq concurrent="1" nextAc="seek">
-              <p:cTn id="2" dur="indefinite" nodeType="mainSeq">
-                <p:childTnLst>
-                  <p:par>
-                    <p:cTn id="3" fill="hold">
-                      <p:stCondLst>
-                        <p:cond delay="indefinite"/>
-                      </p:stCondLst>
-                      <p:childTnLst>
-                        <p:par>
-                          <p:cTn id="4" fill="hold">
-                            <p:stCondLst>
-                              <p:cond delay="0"/>
-                            </p:stCondLst>
-                            <p:childTnLst>
-                              <p:par>
-                                <p:cTn id="5" presetID="1" presetClass="entr" presetSubtype="0" fill="hold" nodeType="clickEffect">
-                                  <p:stCondLst>
-                                    <p:cond delay="0"/>
-                                  </p:stCondLst>
-                                  <p:childTnLst>
-                                    <p:set>
-                                      <p:cBhvr>
-                                        <p:cTn id="6" dur="1" fill="hold">
-                                          <p:stCondLst>
-                                            <p:cond delay="0"/>
-                                          </p:stCondLst>
-                                        </p:cTn>
-                                        <p:tgtEl>
-                                          <p:spTgt spid="4">
-                                            <p:txEl>
-                                              <p:pRg st="1" end="1"/>
-                                            </p:txEl>
-                                          </p:spTgt>
-                                        </p:tgtEl>
-                                        <p:attrNameLst>
-                                          <p:attrName>style.visibility</p:attrName>
-                                        </p:attrNameLst>
-                                      </p:cBhvr>
-                                      <p:to>
-                                        <p:strVal val="visible"/>
-                                      </p:to>
-                                    </p:set>
-                                  </p:childTnLst>
-                                </p:cTn>
-                              </p:par>
-                            </p:childTnLst>
-                          </p:cTn>
-                        </p:par>
-                      </p:childTnLst>
-                    </p:cTn>
-                  </p:par>
-                  <p:par>
-                    <p:cTn id="7" fill="hold">
-                      <p:stCondLst>
-                        <p:cond delay="indefinite"/>
-                      </p:stCondLst>
-                      <p:childTnLst>
-                        <p:par>
-                          <p:cTn id="8" fill="hold">
-                            <p:stCondLst>
-                              <p:cond delay="0"/>
-                            </p:stCondLst>
-                            <p:childTnLst>
-                              <p:par>
-                                <p:cTn id="9" presetID="1" presetClass="entr" presetSubtype="0" fill="hold" nodeType="clickEffect">
-                                  <p:stCondLst>
-                                    <p:cond delay="0"/>
-                                  </p:stCondLst>
-                                  <p:childTnLst>
-                                    <p:set>
-                                      <p:cBhvr>
-                                        <p:cTn id="10" dur="1" fill="hold">
-                                          <p:stCondLst>
-                                            <p:cond delay="0"/>
-                                          </p:stCondLst>
-                                        </p:cTn>
-                                        <p:tgtEl>
-                                          <p:spTgt spid="4">
-                                            <p:txEl>
-                                              <p:pRg st="2" end="2"/>
-                                            </p:txEl>
-                                          </p:spTgt>
-                                        </p:tgtEl>
-                                        <p:attrNameLst>
-                                          <p:attrName>style.visibility</p:attrName>
-                                        </p:attrNameLst>
-                                      </p:cBhvr>
-                                      <p:to>
-                                        <p:strVal val="visible"/>
-                                      </p:to>
-                                    </p:set>
-                                  </p:childTnLst>
-                                </p:cTn>
-                              </p:par>
-                            </p:childTnLst>
-                          </p:cTn>
-                        </p:par>
-                      </p:childTnLst>
-                    </p:cTn>
-                  </p:par>
-                  <p:par>
-                    <p:cTn id="11" fill="hold">
-                      <p:stCondLst>
-                        <p:cond delay="indefinite"/>
-                      </p:stCondLst>
-                      <p:childTnLst>
-                        <p:par>
-                          <p:cTn id="12" fill="hold">
-                            <p:stCondLst>
-                              <p:cond delay="0"/>
-                            </p:stCondLst>
-                            <p:childTnLst>
-                              <p:par>
-                                <p:cTn id="13" presetID="1" presetClass="entr" presetSubtype="0" fill="hold" nodeType="clickEffect">
-                                  <p:stCondLst>
-                                    <p:cond delay="0"/>
-                                  </p:stCondLst>
-                                  <p:childTnLst>
-                                    <p:set>
-                                      <p:cBhvr>
-                                        <p:cTn id="14" dur="1" fill="hold">
-                                          <p:stCondLst>
-                                            <p:cond delay="0"/>
-                                          </p:stCondLst>
-                                        </p:cTn>
-                                        <p:tgtEl>
-                                          <p:spTgt spid="4">
-                                            <p:txEl>
-                                              <p:pRg st="3" end="3"/>
-                                            </p:txEl>
-                                          </p:spTgt>
-                                        </p:tgtEl>
-                                        <p:attrNameLst>
-                                          <p:attrName>style.visibility</p:attrName>
-                                        </p:attrNameLst>
-                                      </p:cBhvr>
-                                      <p:to>
-                                        <p:strVal val="visible"/>
-                                      </p:to>
-                                    </p:set>
-                                  </p:childTnLst>
-                                </p:cTn>
-                              </p:par>
-                            </p:childTnLst>
-                          </p:cTn>
-                        </p:par>
-                      </p:childTnLst>
-                    </p:cTn>
-                  </p:par>
-                  <p:par>
-                    <p:cTn id="15" fill="hold">
-                      <p:stCondLst>
-                        <p:cond delay="indefinite"/>
-                      </p:stCondLst>
-                      <p:childTnLst>
-                        <p:par>
-                          <p:cTn id="16" fill="hold">
-                            <p:stCondLst>
-                              <p:cond delay="0"/>
-                            </p:stCondLst>
-                            <p:childTnLst>
-                              <p:par>
-                                <p:cTn id="17" presetID="1" presetClass="entr" presetSubtype="0" fill="hold" nodeType="clickEffect">
-                                  <p:stCondLst>
-                                    <p:cond delay="0"/>
-                                  </p:stCondLst>
-                                  <p:childTnLst>
-                                    <p:set>
-                                      <p:cBhvr>
-                                        <p:cTn id="18" dur="1" fill="hold">
-                                          <p:stCondLst>
-                                            <p:cond delay="0"/>
-                                          </p:stCondLst>
-                                        </p:cTn>
-                                        <p:tgtEl>
-                                          <p:spTgt spid="4">
-                                            <p:txEl>
-                                              <p:pRg st="4" end="4"/>
-                                            </p:txEl>
-                                          </p:spTgt>
-                                        </p:tgtEl>
-                                        <p:attrNameLst>
-                                          <p:attrName>style.visibility</p:attrName>
-                                        </p:attrNameLst>
-                                      </p:cBhvr>
-                                      <p:to>
-                                        <p:strVal val="visible"/>
-                                      </p:to>
-                                    </p:set>
-                                  </p:childTnLst>
-                                </p:cTn>
-                              </p:par>
-                            </p:childTnLst>
-                          </p:cTn>
-                        </p:par>
-                      </p:childTnLst>
-                    </p:cTn>
-                  </p:par>
-                </p:childTnLst>
-              </p:cTn>
-              <p:prevCondLst>
-                <p:cond evt="onPrev" delay="0">
-                  <p:tgtEl>
-                    <p:sldTgt/>
-                  </p:tgtEl>
-                </p:cond>
-              </p:prevCondLst>
-              <p:nextCondLst>
-                <p:cond evt="onNext" delay="0">
-                  <p:tgtEl>
-                    <p:sldTgt/>
-                  </p:tgtEl>
-                </p:cond>
-              </p:nextCondLst>
-            </p:seq>
-          </p:childTnLst>
-        </p:cTn>
-      </p:par>
-    </p:tnLst>
-  </p:timing>
-</p:sld>
-</file>
-
-<file path=ppt/slides/slide35.xml><?xml version="1.0" encoding="utf-8"?>
-<p:sld xmlns:a="http://schemas.openxmlformats.org/drawingml/2006/main" xmlns:r="http://schemas.openxmlformats.org/officeDocument/2006/relationships" xmlns:p="http://schemas.openxmlformats.org/presentationml/2006/main">
-  <p:cSld>
-    <p:spTree>
-      <p:nvGrpSpPr>
-        <p:cNvPr id="1" name=""/>
-        <p:cNvGrpSpPr/>
-        <p:nvPr/>
-      </p:nvGrpSpPr>
-      <p:grpSpPr>
-        <a:xfrm>
-          <a:off x="0" y="0"/>
-          <a:ext cx="0" cy="0"/>
-          <a:chOff x="0" y="0"/>
-          <a:chExt cx="0" cy="0"/>
-        </a:xfrm>
-      </p:grpSpPr>
-      <p:sp>
-        <p:nvSpPr>
-          <p:cNvPr id="2" name="Title 1"/>
-          <p:cNvSpPr>
-            <a:spLocks noGrp="1"/>
-          </p:cNvSpPr>
-          <p:nvPr>
-            <p:ph type="title"/>
-          </p:nvPr>
-        </p:nvSpPr>
-        <p:spPr>
-          <a:xfrm>
-            <a:off x="457201" y="204787"/>
-            <a:ext cx="7884621" cy="543358"/>
-          </a:xfrm>
-        </p:spPr>
-        <p:txBody>
-          <a:bodyPr>
-            <a:noAutofit/>
-          </a:bodyPr>
-          <a:lstStyle/>
-          <a:p>
-            <a:pPr marL="0" lvl="0" indent="0">
-              <a:buNone/>
-            </a:pPr>
-            <a:r>
-              <a:rPr sz="3200" b="0" dirty="0"/>
-              <a:t>Time Series With Trend</a:t>
-            </a:r>
-          </a:p>
-        </p:txBody>
-      </p:sp>
-      <p:sp>
-        <p:nvSpPr>
-          <p:cNvPr id="4" name="Text Placeholder 3"/>
-          <p:cNvSpPr>
-            <a:spLocks noGrp="1"/>
-          </p:cNvSpPr>
-          <p:nvPr>
-            <p:ph type="body" sz="half" idx="2"/>
-          </p:nvPr>
-        </p:nvSpPr>
-        <p:spPr>
-          <a:xfrm>
-            <a:off x="457201" y="1076327"/>
-            <a:ext cx="7884621" cy="1733376"/>
-          </a:xfrm>
-        </p:spPr>
-        <p:txBody>
-          <a:bodyPr>
-            <a:noAutofit/>
-          </a:bodyPr>
-          <a:lstStyle/>
-          <a:p>
-            <a:pPr marL="0" lvl="0" indent="0">
-              <a:buNone/>
-            </a:pPr>
-            <a:r>
-              <a:rPr sz="2000" dirty="0"/>
-              <a:t>Time series with trend are non-stationary</a:t>
-            </a:r>
-          </a:p>
-          <a:p>
-            <a:pPr marL="342900" lvl="0" indent="-342900">
-              <a:buFont typeface="Arial" panose="020B0604020202020204" pitchFamily="34" charset="0"/>
-              <a:buChar char="•"/>
-            </a:pPr>
-            <a:r>
-              <a:rPr sz="2000" dirty="0"/>
-              <a:t>Any time series with trend is non-stationary</a:t>
-            </a:r>
-            <a:endParaRPr lang="en-US" sz="2000" dirty="0"/>
-          </a:p>
-          <a:p>
-            <a:pPr marL="342900" lvl="0" indent="-342900">
-              <a:buFont typeface="Arial" panose="020B0604020202020204" pitchFamily="34" charset="0"/>
-              <a:buChar char="•"/>
-            </a:pPr>
-            <a:r>
-              <a:rPr sz="2000" dirty="0"/>
-              <a:t>Mean and variance are dependent o</a:t>
-            </a:r>
-            <a:r>
-              <a:rPr lang="en-US" sz="2000" dirty="0"/>
-              <a:t>n</a:t>
-            </a:r>
-            <a:r>
-              <a:rPr sz="2000" dirty="0"/>
-              <a:t> window used to compute them</a:t>
-            </a:r>
-          </a:p>
-          <a:p>
-            <a:pPr marL="342900" lvl="0" indent="-342900">
-              <a:buFont typeface="Arial" panose="020B0604020202020204" pitchFamily="34" charset="0"/>
-              <a:buChar char="•"/>
-            </a:pPr>
-            <a:r>
-              <a:rPr sz="2000" dirty="0"/>
-              <a:t>The distribution of even a white noise series with trend is non-Normal</a:t>
-            </a:r>
-          </a:p>
-        </p:txBody>
-      </p:sp>
-      <p:pic>
-        <p:nvPicPr>
-          <p:cNvPr id="6" name="Picture 5">
-            <a:extLst>
-              <a:ext uri="{FF2B5EF4-FFF2-40B4-BE49-F238E27FC236}">
-                <a16:creationId xmlns:a16="http://schemas.microsoft.com/office/drawing/2014/main" id="{365A7A4E-751D-9BB6-9D27-5C098252EDA3}"/>
-              </a:ext>
-            </a:extLst>
-          </p:cNvPr>
-          <p:cNvPicPr>
-            <a:picLocks noChangeAspect="1"/>
-          </p:cNvPicPr>
-          <p:nvPr/>
-        </p:nvPicPr>
-        <p:blipFill>
-          <a:blip r:embed="rId2"/>
-          <a:stretch>
-            <a:fillRect/>
-          </a:stretch>
-        </p:blipFill>
-        <p:spPr>
-          <a:xfrm>
-            <a:off x="1924396" y="2730731"/>
-            <a:ext cx="5265699" cy="2373839"/>
-          </a:xfrm>
-          <a:prstGeom prst="rect">
-            <a:avLst/>
-          </a:prstGeom>
-        </p:spPr>
-      </p:pic>
-    </p:spTree>
-  </p:cSld>
-  <p:clrMapOvr>
-    <a:masterClrMapping/>
-  </p:clrMapOvr>
-  <p:timing>
-    <p:tnLst>
-      <p:par>
-        <p:cTn id="1" dur="indefinite" restart="never" nodeType="tmRoot">
-          <p:childTnLst>
-            <p:seq concurrent="1" nextAc="seek">
-              <p:cTn id="2" dur="indefinite" nodeType="mainSeq">
-                <p:childTnLst>
-                  <p:par>
-                    <p:cTn id="3" fill="hold">
-                      <p:stCondLst>
-                        <p:cond delay="indefinite"/>
-                      </p:stCondLst>
-                      <p:childTnLst>
-                        <p:par>
-                          <p:cTn id="4" fill="hold">
-                            <p:stCondLst>
-                              <p:cond delay="0"/>
-                            </p:stCondLst>
-                            <p:childTnLst>
-                              <p:par>
-                                <p:cTn id="5" presetID="1" presetClass="entr" presetSubtype="0" fill="hold" nodeType="clickEffect">
-                                  <p:stCondLst>
-                                    <p:cond delay="0"/>
-                                  </p:stCondLst>
-                                  <p:childTnLst>
-                                    <p:set>
-                                      <p:cBhvr>
-                                        <p:cTn id="6" dur="1" fill="hold">
-                                          <p:stCondLst>
-                                            <p:cond delay="0"/>
-                                          </p:stCondLst>
-                                        </p:cTn>
-                                        <p:tgtEl>
-                                          <p:spTgt spid="4">
-                                            <p:txEl>
-                                              <p:pRg st="1" end="1"/>
-                                            </p:txEl>
-                                          </p:spTgt>
-                                        </p:tgtEl>
-                                        <p:attrNameLst>
-                                          <p:attrName>style.visibility</p:attrName>
-                                        </p:attrNameLst>
-                                      </p:cBhvr>
-                                      <p:to>
-                                        <p:strVal val="visible"/>
-                                      </p:to>
-                                    </p:set>
-                                  </p:childTnLst>
-                                </p:cTn>
-                              </p:par>
-                            </p:childTnLst>
-                          </p:cTn>
-                        </p:par>
-                      </p:childTnLst>
-                    </p:cTn>
-                  </p:par>
-                  <p:par>
-                    <p:cTn id="7" fill="hold">
-                      <p:stCondLst>
-                        <p:cond delay="indefinite"/>
-                      </p:stCondLst>
-                      <p:childTnLst>
-                        <p:par>
-                          <p:cTn id="8" fill="hold">
-                            <p:stCondLst>
-                              <p:cond delay="0"/>
-                            </p:stCondLst>
-                            <p:childTnLst>
-                              <p:par>
-                                <p:cTn id="9" presetID="1" presetClass="entr" presetSubtype="0" fill="hold" nodeType="clickEffect">
-                                  <p:stCondLst>
-                                    <p:cond delay="0"/>
-                                  </p:stCondLst>
-                                  <p:childTnLst>
-                                    <p:set>
-                                      <p:cBhvr>
-                                        <p:cTn id="10" dur="1" fill="hold">
-                                          <p:stCondLst>
-                                            <p:cond delay="0"/>
-                                          </p:stCondLst>
-                                        </p:cTn>
-                                        <p:tgtEl>
-                                          <p:spTgt spid="4">
-                                            <p:txEl>
-                                              <p:pRg st="2" end="2"/>
-                                            </p:txEl>
-                                          </p:spTgt>
-                                        </p:tgtEl>
-                                        <p:attrNameLst>
-                                          <p:attrName>style.visibility</p:attrName>
-                                        </p:attrNameLst>
-                                      </p:cBhvr>
-                                      <p:to>
-                                        <p:strVal val="visible"/>
-                                      </p:to>
-                                    </p:set>
-                                  </p:childTnLst>
-                                </p:cTn>
-                              </p:par>
-                            </p:childTnLst>
-                          </p:cTn>
-                        </p:par>
-                      </p:childTnLst>
-                    </p:cTn>
-                  </p:par>
-                  <p:par>
-                    <p:cTn id="11" fill="hold">
-                      <p:stCondLst>
-                        <p:cond delay="indefinite"/>
-                      </p:stCondLst>
-                      <p:childTnLst>
-                        <p:par>
-                          <p:cTn id="12" fill="hold">
-                            <p:stCondLst>
-                              <p:cond delay="0"/>
-                            </p:stCondLst>
-                            <p:childTnLst>
-                              <p:par>
-                                <p:cTn id="13" presetID="1" presetClass="entr" presetSubtype="0" fill="hold" nodeType="clickEffect">
-                                  <p:stCondLst>
-                                    <p:cond delay="0"/>
-                                  </p:stCondLst>
-                                  <p:childTnLst>
-                                    <p:set>
-                                      <p:cBhvr>
-                                        <p:cTn id="14" dur="1" fill="hold">
-                                          <p:stCondLst>
-                                            <p:cond delay="0"/>
-                                          </p:stCondLst>
-                                        </p:cTn>
-                                        <p:tgtEl>
-                                          <p:spTgt spid="4">
-                                            <p:txEl>
-                                              <p:pRg st="3" end="3"/>
-                                            </p:txEl>
-                                          </p:spTgt>
-                                        </p:tgtEl>
-                                        <p:attrNameLst>
-                                          <p:attrName>style.visibility</p:attrName>
-                                        </p:attrNameLst>
-                                      </p:cBhvr>
-                                      <p:to>
-                                        <p:strVal val="visible"/>
-                                      </p:to>
-                                    </p:set>
-                                  </p:childTnLst>
-                                </p:cTn>
-                              </p:par>
-                              <p:par>
-                                <p:cTn id="15" presetID="1" presetClass="entr" presetSubtype="0" fill="hold" nodeType="withEffect">
-                                  <p:stCondLst>
-                                    <p:cond delay="0"/>
-                                  </p:stCondLst>
-                                  <p:childTnLst>
-                                    <p:set>
-                                      <p:cBhvr>
-                                        <p:cTn id="16" dur="1" fill="hold">
-                                          <p:stCondLst>
-                                            <p:cond delay="0"/>
-                                          </p:stCondLst>
-                                        </p:cTn>
-                                        <p:tgtEl>
-                                          <p:spTgt spid="6"/>
-                                        </p:tgtEl>
-                                        <p:attrNameLst>
-                                          <p:attrName>style.visibility</p:attrName>
-                                        </p:attrNameLst>
-                                      </p:cBhvr>
-                                      <p:to>
-                                        <p:strVal val="visible"/>
-                                      </p:to>
-                                    </p:set>
-                                  </p:childTnLst>
-                                </p:cTn>
-                              </p:par>
-                            </p:childTnLst>
-                          </p:cTn>
-                        </p:par>
-                      </p:childTnLst>
-                    </p:cTn>
-                  </p:par>
-                </p:childTnLst>
-              </p:cTn>
-              <p:prevCondLst>
-                <p:cond evt="onPrev" delay="0">
-                  <p:tgtEl>
-                    <p:sldTgt/>
-                  </p:tgtEl>
-                </p:cond>
-              </p:prevCondLst>
-              <p:nextCondLst>
-                <p:cond evt="onNext" delay="0">
-                  <p:tgtEl>
-                    <p:sldTgt/>
-                  </p:tgtEl>
-                </p:cond>
-              </p:nextCondLst>
-            </p:seq>
-          </p:childTnLst>
-        </p:cTn>
-      </p:par>
-    </p:tnLst>
-  </p:timing>
-</p:sld>
-</file>
-
-<file path=ppt/slides/slide36.xml><?xml version="1.0" encoding="utf-8"?>
-<p:sld xmlns:a="http://schemas.openxmlformats.org/drawingml/2006/main" xmlns:r="http://schemas.openxmlformats.org/officeDocument/2006/relationships" xmlns:p="http://schemas.openxmlformats.org/presentationml/2006/main">
-  <p:cSld>
-    <p:spTree>
-      <p:nvGrpSpPr>
         <p:cNvPr id="1" name="">
           <a:extLst>
             <a:ext uri="{FF2B5EF4-FFF2-40B4-BE49-F238E27FC236}">
@@ -17003,8 +16246,8 @@
           </a:p>
         </p:txBody>
       </p:sp>
-      <mc:AlternateContent xmlns:mc="http://schemas.openxmlformats.org/markup-compatibility/2006">
-        <mc:Choice xmlns:a14="http://schemas.microsoft.com/office/drawing/2010/main" Requires="a14">
+      <mc:AlternateContent xmlns:mc="http://schemas.openxmlformats.org/markup-compatibility/2006" xmlns:a14="http://schemas.microsoft.com/office/drawing/2010/main">
+        <mc:Choice Requires="a14">
           <p:sp>
             <p:nvSpPr>
               <p:cNvPr id="4" name="Text Placeholder 3">
@@ -17384,7 +16627,7 @@
             </p:txBody>
           </p:sp>
         </mc:Choice>
-        <mc:Fallback>
+        <mc:Fallback xmlns="">
           <p:sp>
             <p:nvSpPr>
               <p:cNvPr id="4" name="Text Placeholder 3">
@@ -17468,6 +16711,762 @@
   <p:clrMapOvr>
     <a:masterClrMapping/>
   </p:clrMapOvr>
+</p:sld>
+</file>
+
+<file path=ppt/slides/slide35.xml><?xml version="1.0" encoding="utf-8"?>
+<p:sld xmlns:a="http://schemas.openxmlformats.org/drawingml/2006/main" xmlns:r="http://schemas.openxmlformats.org/officeDocument/2006/relationships" xmlns:p="http://schemas.openxmlformats.org/presentationml/2006/main">
+  <p:cSld>
+    <p:spTree>
+      <p:nvGrpSpPr>
+        <p:cNvPr id="1" name=""/>
+        <p:cNvGrpSpPr/>
+        <p:nvPr/>
+      </p:nvGrpSpPr>
+      <p:grpSpPr>
+        <a:xfrm>
+          <a:off x="0" y="0"/>
+          <a:ext cx="0" cy="0"/>
+          <a:chOff x="0" y="0"/>
+          <a:chExt cx="0" cy="0"/>
+        </a:xfrm>
+      </p:grpSpPr>
+      <p:sp>
+        <p:nvSpPr>
+          <p:cNvPr id="2" name="Title 1"/>
+          <p:cNvSpPr>
+            <a:spLocks noGrp="1"/>
+          </p:cNvSpPr>
+          <p:nvPr>
+            <p:ph type="title"/>
+          </p:nvPr>
+        </p:nvSpPr>
+        <p:spPr>
+          <a:xfrm>
+            <a:off x="457200" y="204787"/>
+            <a:ext cx="8325195" cy="672206"/>
+          </a:xfrm>
+        </p:spPr>
+        <p:txBody>
+          <a:bodyPr>
+            <a:normAutofit/>
+          </a:bodyPr>
+          <a:lstStyle/>
+          <a:p>
+            <a:pPr marL="0" lvl="0" indent="0" algn="ctr">
+              <a:buNone/>
+            </a:pPr>
+            <a:r>
+              <a:rPr sz="3200" b="0" dirty="0"/>
+              <a:t>Time Series With Trend</a:t>
+            </a:r>
+          </a:p>
+        </p:txBody>
+      </p:sp>
+      <p:sp>
+        <p:nvSpPr>
+          <p:cNvPr id="4" name="Text Placeholder 3"/>
+          <p:cNvSpPr>
+            <a:spLocks noGrp="1"/>
+          </p:cNvSpPr>
+          <p:nvPr>
+            <p:ph type="body" sz="half" idx="2"/>
+          </p:nvPr>
+        </p:nvSpPr>
+        <p:spPr>
+          <a:xfrm>
+            <a:off x="457201" y="1076326"/>
+            <a:ext cx="4804755" cy="3518297"/>
+          </a:xfrm>
+        </p:spPr>
+        <p:txBody>
+          <a:bodyPr>
+            <a:normAutofit/>
+          </a:bodyPr>
+          <a:lstStyle/>
+          <a:p>
+            <a:pPr marL="0" lvl="0" indent="0">
+              <a:buNone/>
+            </a:pPr>
+            <a:r>
+              <a:rPr sz="2000" dirty="0"/>
+              <a:t>ACF and PACF are only properly defined for stationary series</a:t>
+            </a:r>
+          </a:p>
+          <a:p>
+            <a:pPr marL="342900" lvl="0" indent="-342900">
+              <a:buFont typeface="Arial" panose="020B0604020202020204" pitchFamily="34" charset="0"/>
+              <a:buChar char="•"/>
+            </a:pPr>
+            <a:r>
+              <a:rPr sz="2000" dirty="0"/>
+              <a:t>For non-stationary series, the ACF dies off slowly</a:t>
+            </a:r>
+          </a:p>
+          <a:p>
+            <a:pPr marL="342900" indent="-342900">
+              <a:buFont typeface="Arial" panose="020B0604020202020204" pitchFamily="34" charset="0"/>
+              <a:buChar char="•"/>
+            </a:pPr>
+            <a:r>
+              <a:rPr sz="2150" dirty="0"/>
+              <a:t>Integrating innovations leads to </a:t>
+            </a:r>
+            <a:r>
+              <a:rPr sz="2150" b="1" dirty="0"/>
+              <a:t>long-term dependency</a:t>
+            </a:r>
+          </a:p>
+          <a:p>
+            <a:pPr marL="342900" lvl="0" indent="-342900">
+              <a:buFont typeface="Arial" panose="020B0604020202020204" pitchFamily="34" charset="0"/>
+              <a:buChar char="•"/>
+            </a:pPr>
+            <a:r>
+              <a:rPr sz="2000" dirty="0"/>
+              <a:t>The PACF dies off quickly with lag</a:t>
+            </a:r>
+            <a:r>
+              <a:rPr lang="en-US" sz="2000" dirty="0"/>
+              <a:t>, but generally slower than random walk</a:t>
+            </a:r>
+            <a:endParaRPr sz="2000" dirty="0"/>
+          </a:p>
+          <a:p>
+            <a:pPr marL="342900" lvl="0" indent="-342900">
+              <a:buFont typeface="Arial" panose="020B0604020202020204" pitchFamily="34" charset="0"/>
+              <a:buChar char="•"/>
+            </a:pPr>
+            <a:r>
+              <a:rPr sz="2000" dirty="0"/>
+              <a:t>Example: ACF and PACF of the white noise series with trend</a:t>
+            </a:r>
+          </a:p>
+        </p:txBody>
+      </p:sp>
+      <p:pic>
+        <p:nvPicPr>
+          <p:cNvPr id="6" name="Picture 5">
+            <a:extLst>
+              <a:ext uri="{FF2B5EF4-FFF2-40B4-BE49-F238E27FC236}">
+                <a16:creationId xmlns:a16="http://schemas.microsoft.com/office/drawing/2014/main" id="{3D057999-4447-A214-3501-C78BCAE43216}"/>
+              </a:ext>
+            </a:extLst>
+          </p:cNvPr>
+          <p:cNvPicPr>
+            <a:picLocks noChangeAspect="1"/>
+          </p:cNvPicPr>
+          <p:nvPr/>
+        </p:nvPicPr>
+        <p:blipFill>
+          <a:blip r:embed="rId2"/>
+          <a:stretch>
+            <a:fillRect/>
+          </a:stretch>
+        </p:blipFill>
+        <p:spPr>
+          <a:xfrm>
+            <a:off x="5428773" y="1473496"/>
+            <a:ext cx="3598643" cy="3518297"/>
+          </a:xfrm>
+          <a:prstGeom prst="rect">
+            <a:avLst/>
+          </a:prstGeom>
+        </p:spPr>
+      </p:pic>
+    </p:spTree>
+  </p:cSld>
+  <p:clrMapOvr>
+    <a:masterClrMapping/>
+  </p:clrMapOvr>
+  <p:timing>
+    <p:tnLst>
+      <p:par>
+        <p:cTn id="1" dur="indefinite" restart="never" nodeType="tmRoot">
+          <p:childTnLst>
+            <p:seq concurrent="1" nextAc="seek">
+              <p:cTn id="2" dur="indefinite" nodeType="mainSeq">
+                <p:childTnLst>
+                  <p:par>
+                    <p:cTn id="3" fill="hold">
+                      <p:stCondLst>
+                        <p:cond delay="indefinite"/>
+                      </p:stCondLst>
+                      <p:childTnLst>
+                        <p:par>
+                          <p:cTn id="4" fill="hold">
+                            <p:stCondLst>
+                              <p:cond delay="0"/>
+                            </p:stCondLst>
+                            <p:childTnLst>
+                              <p:par>
+                                <p:cTn id="5" presetID="1" presetClass="entr" presetSubtype="0" fill="hold" nodeType="clickEffect">
+                                  <p:stCondLst>
+                                    <p:cond delay="0"/>
+                                  </p:stCondLst>
+                                  <p:childTnLst>
+                                    <p:set>
+                                      <p:cBhvr>
+                                        <p:cTn id="6" dur="1" fill="hold">
+                                          <p:stCondLst>
+                                            <p:cond delay="0"/>
+                                          </p:stCondLst>
+                                        </p:cTn>
+                                        <p:tgtEl>
+                                          <p:spTgt spid="4">
+                                            <p:txEl>
+                                              <p:pRg st="1" end="1"/>
+                                            </p:txEl>
+                                          </p:spTgt>
+                                        </p:tgtEl>
+                                        <p:attrNameLst>
+                                          <p:attrName>style.visibility</p:attrName>
+                                        </p:attrNameLst>
+                                      </p:cBhvr>
+                                      <p:to>
+                                        <p:strVal val="visible"/>
+                                      </p:to>
+                                    </p:set>
+                                  </p:childTnLst>
+                                </p:cTn>
+                              </p:par>
+                            </p:childTnLst>
+                          </p:cTn>
+                        </p:par>
+                      </p:childTnLst>
+                    </p:cTn>
+                  </p:par>
+                  <p:par>
+                    <p:cTn id="7" fill="hold">
+                      <p:stCondLst>
+                        <p:cond delay="indefinite"/>
+                      </p:stCondLst>
+                      <p:childTnLst>
+                        <p:par>
+                          <p:cTn id="8" fill="hold">
+                            <p:stCondLst>
+                              <p:cond delay="0"/>
+                            </p:stCondLst>
+                            <p:childTnLst>
+                              <p:par>
+                                <p:cTn id="9" presetID="1" presetClass="entr" presetSubtype="0" fill="hold" nodeType="clickEffect">
+                                  <p:stCondLst>
+                                    <p:cond delay="0"/>
+                                  </p:stCondLst>
+                                  <p:childTnLst>
+                                    <p:set>
+                                      <p:cBhvr>
+                                        <p:cTn id="10" dur="1" fill="hold">
+                                          <p:stCondLst>
+                                            <p:cond delay="0"/>
+                                          </p:stCondLst>
+                                        </p:cTn>
+                                        <p:tgtEl>
+                                          <p:spTgt spid="4">
+                                            <p:txEl>
+                                              <p:pRg st="2" end="2"/>
+                                            </p:txEl>
+                                          </p:spTgt>
+                                        </p:tgtEl>
+                                        <p:attrNameLst>
+                                          <p:attrName>style.visibility</p:attrName>
+                                        </p:attrNameLst>
+                                      </p:cBhvr>
+                                      <p:to>
+                                        <p:strVal val="visible"/>
+                                      </p:to>
+                                    </p:set>
+                                  </p:childTnLst>
+                                </p:cTn>
+                              </p:par>
+                            </p:childTnLst>
+                          </p:cTn>
+                        </p:par>
+                      </p:childTnLst>
+                    </p:cTn>
+                  </p:par>
+                  <p:par>
+                    <p:cTn id="11" fill="hold">
+                      <p:stCondLst>
+                        <p:cond delay="indefinite"/>
+                      </p:stCondLst>
+                      <p:childTnLst>
+                        <p:par>
+                          <p:cTn id="12" fill="hold">
+                            <p:stCondLst>
+                              <p:cond delay="0"/>
+                            </p:stCondLst>
+                            <p:childTnLst>
+                              <p:par>
+                                <p:cTn id="13" presetID="1" presetClass="entr" presetSubtype="0" fill="hold" nodeType="clickEffect">
+                                  <p:stCondLst>
+                                    <p:cond delay="0"/>
+                                  </p:stCondLst>
+                                  <p:childTnLst>
+                                    <p:set>
+                                      <p:cBhvr>
+                                        <p:cTn id="14" dur="1" fill="hold">
+                                          <p:stCondLst>
+                                            <p:cond delay="0"/>
+                                          </p:stCondLst>
+                                        </p:cTn>
+                                        <p:tgtEl>
+                                          <p:spTgt spid="4">
+                                            <p:txEl>
+                                              <p:pRg st="3" end="3"/>
+                                            </p:txEl>
+                                          </p:spTgt>
+                                        </p:tgtEl>
+                                        <p:attrNameLst>
+                                          <p:attrName>style.visibility</p:attrName>
+                                        </p:attrNameLst>
+                                      </p:cBhvr>
+                                      <p:to>
+                                        <p:strVal val="visible"/>
+                                      </p:to>
+                                    </p:set>
+                                  </p:childTnLst>
+                                </p:cTn>
+                              </p:par>
+                            </p:childTnLst>
+                          </p:cTn>
+                        </p:par>
+                      </p:childTnLst>
+                    </p:cTn>
+                  </p:par>
+                  <p:par>
+                    <p:cTn id="15" fill="hold">
+                      <p:stCondLst>
+                        <p:cond delay="indefinite"/>
+                      </p:stCondLst>
+                      <p:childTnLst>
+                        <p:par>
+                          <p:cTn id="16" fill="hold">
+                            <p:stCondLst>
+                              <p:cond delay="0"/>
+                            </p:stCondLst>
+                            <p:childTnLst>
+                              <p:par>
+                                <p:cTn id="17" presetID="1" presetClass="entr" presetSubtype="0" fill="hold" nodeType="clickEffect">
+                                  <p:stCondLst>
+                                    <p:cond delay="0"/>
+                                  </p:stCondLst>
+                                  <p:childTnLst>
+                                    <p:set>
+                                      <p:cBhvr>
+                                        <p:cTn id="18" dur="1" fill="hold">
+                                          <p:stCondLst>
+                                            <p:cond delay="0"/>
+                                          </p:stCondLst>
+                                        </p:cTn>
+                                        <p:tgtEl>
+                                          <p:spTgt spid="4">
+                                            <p:txEl>
+                                              <p:pRg st="4" end="4"/>
+                                            </p:txEl>
+                                          </p:spTgt>
+                                        </p:tgtEl>
+                                        <p:attrNameLst>
+                                          <p:attrName>style.visibility</p:attrName>
+                                        </p:attrNameLst>
+                                      </p:cBhvr>
+                                      <p:to>
+                                        <p:strVal val="visible"/>
+                                      </p:to>
+                                    </p:set>
+                                  </p:childTnLst>
+                                </p:cTn>
+                              </p:par>
+                            </p:childTnLst>
+                          </p:cTn>
+                        </p:par>
+                      </p:childTnLst>
+                    </p:cTn>
+                  </p:par>
+                </p:childTnLst>
+              </p:cTn>
+              <p:prevCondLst>
+                <p:cond evt="onPrev" delay="0">
+                  <p:tgtEl>
+                    <p:sldTgt/>
+                  </p:tgtEl>
+                </p:cond>
+              </p:prevCondLst>
+              <p:nextCondLst>
+                <p:cond evt="onNext" delay="0">
+                  <p:tgtEl>
+                    <p:sldTgt/>
+                  </p:tgtEl>
+                </p:cond>
+              </p:nextCondLst>
+            </p:seq>
+          </p:childTnLst>
+        </p:cTn>
+      </p:par>
+    </p:tnLst>
+  </p:timing>
+</p:sld>
+</file>
+
+<file path=ppt/slides/slide36.xml><?xml version="1.0" encoding="utf-8"?>
+<p:sld xmlns:a="http://schemas.openxmlformats.org/drawingml/2006/main" xmlns:r="http://schemas.openxmlformats.org/officeDocument/2006/relationships" xmlns:p="http://schemas.openxmlformats.org/presentationml/2006/main">
+  <p:cSld>
+    <p:spTree>
+      <p:nvGrpSpPr>
+        <p:cNvPr id="1" name=""/>
+        <p:cNvGrpSpPr/>
+        <p:nvPr/>
+      </p:nvGrpSpPr>
+      <p:grpSpPr>
+        <a:xfrm>
+          <a:off x="0" y="0"/>
+          <a:ext cx="0" cy="0"/>
+          <a:chOff x="0" y="0"/>
+          <a:chExt cx="0" cy="0"/>
+        </a:xfrm>
+      </p:grpSpPr>
+      <p:sp>
+        <p:nvSpPr>
+          <p:cNvPr id="2" name="Title 1"/>
+          <p:cNvSpPr>
+            <a:spLocks noGrp="1"/>
+          </p:cNvSpPr>
+          <p:nvPr>
+            <p:ph type="title"/>
+          </p:nvPr>
+        </p:nvSpPr>
+        <p:spPr>
+          <a:xfrm>
+            <a:off x="457201" y="204787"/>
+            <a:ext cx="7884621" cy="543358"/>
+          </a:xfrm>
+        </p:spPr>
+        <p:txBody>
+          <a:bodyPr>
+            <a:noAutofit/>
+          </a:bodyPr>
+          <a:lstStyle/>
+          <a:p>
+            <a:pPr marL="0" lvl="0" indent="0">
+              <a:buNone/>
+            </a:pPr>
+            <a:r>
+              <a:rPr sz="3200" b="0" dirty="0"/>
+              <a:t>Time Series With Trend</a:t>
+            </a:r>
+          </a:p>
+        </p:txBody>
+      </p:sp>
+      <p:sp>
+        <p:nvSpPr>
+          <p:cNvPr id="4" name="Text Placeholder 3"/>
+          <p:cNvSpPr>
+            <a:spLocks noGrp="1"/>
+          </p:cNvSpPr>
+          <p:nvPr>
+            <p:ph type="body" sz="half" idx="2"/>
+          </p:nvPr>
+        </p:nvSpPr>
+        <p:spPr>
+          <a:xfrm>
+            <a:off x="457201" y="1076327"/>
+            <a:ext cx="7884621" cy="1733376"/>
+          </a:xfrm>
+        </p:spPr>
+        <p:txBody>
+          <a:bodyPr>
+            <a:noAutofit/>
+          </a:bodyPr>
+          <a:lstStyle/>
+          <a:p>
+            <a:pPr marL="0" lvl="0" indent="0">
+              <a:buNone/>
+            </a:pPr>
+            <a:r>
+              <a:rPr sz="2000" dirty="0"/>
+              <a:t>Time series with trend are non-stationary</a:t>
+            </a:r>
+          </a:p>
+          <a:p>
+            <a:pPr marL="342900" lvl="0" indent="-342900">
+              <a:buFont typeface="Arial" panose="020B0604020202020204" pitchFamily="34" charset="0"/>
+              <a:buChar char="•"/>
+            </a:pPr>
+            <a:r>
+              <a:rPr sz="2000" dirty="0"/>
+              <a:t>Any time series with trend is non-stationary</a:t>
+            </a:r>
+            <a:endParaRPr lang="en-US" sz="2000" dirty="0"/>
+          </a:p>
+          <a:p>
+            <a:pPr marL="342900" lvl="0" indent="-342900">
+              <a:buFont typeface="Arial" panose="020B0604020202020204" pitchFamily="34" charset="0"/>
+              <a:buChar char="•"/>
+            </a:pPr>
+            <a:r>
+              <a:rPr sz="2000" dirty="0"/>
+              <a:t>Mean and variance are dependent o</a:t>
+            </a:r>
+            <a:r>
+              <a:rPr lang="en-US" sz="2000" dirty="0"/>
+              <a:t>n</a:t>
+            </a:r>
+            <a:r>
+              <a:rPr sz="2000" dirty="0"/>
+              <a:t> window used to compute them</a:t>
+            </a:r>
+          </a:p>
+          <a:p>
+            <a:pPr marL="342900" lvl="0" indent="-342900">
+              <a:buFont typeface="Arial" panose="020B0604020202020204" pitchFamily="34" charset="0"/>
+              <a:buChar char="•"/>
+            </a:pPr>
+            <a:r>
+              <a:rPr sz="2000" dirty="0"/>
+              <a:t>The distribution of even a white noise series with trend is non-Normal</a:t>
+            </a:r>
+          </a:p>
+        </p:txBody>
+      </p:sp>
+      <p:pic>
+        <p:nvPicPr>
+          <p:cNvPr id="6" name="Picture 5">
+            <a:extLst>
+              <a:ext uri="{FF2B5EF4-FFF2-40B4-BE49-F238E27FC236}">
+                <a16:creationId xmlns:a16="http://schemas.microsoft.com/office/drawing/2014/main" id="{365A7A4E-751D-9BB6-9D27-5C098252EDA3}"/>
+              </a:ext>
+            </a:extLst>
+          </p:cNvPr>
+          <p:cNvPicPr>
+            <a:picLocks noChangeAspect="1"/>
+          </p:cNvPicPr>
+          <p:nvPr/>
+        </p:nvPicPr>
+        <p:blipFill>
+          <a:blip r:embed="rId2"/>
+          <a:stretch>
+            <a:fillRect/>
+          </a:stretch>
+        </p:blipFill>
+        <p:spPr>
+          <a:xfrm>
+            <a:off x="1924396" y="2730731"/>
+            <a:ext cx="5265699" cy="2373839"/>
+          </a:xfrm>
+          <a:prstGeom prst="rect">
+            <a:avLst/>
+          </a:prstGeom>
+        </p:spPr>
+      </p:pic>
+    </p:spTree>
+  </p:cSld>
+  <p:clrMapOvr>
+    <a:masterClrMapping/>
+  </p:clrMapOvr>
+  <p:timing>
+    <p:tnLst>
+      <p:par>
+        <p:cTn id="1" dur="indefinite" restart="never" nodeType="tmRoot">
+          <p:childTnLst>
+            <p:seq concurrent="1" nextAc="seek">
+              <p:cTn id="2" dur="indefinite" nodeType="mainSeq">
+                <p:childTnLst>
+                  <p:par>
+                    <p:cTn id="3" fill="hold">
+                      <p:stCondLst>
+                        <p:cond delay="indefinite"/>
+                      </p:stCondLst>
+                      <p:childTnLst>
+                        <p:par>
+                          <p:cTn id="4" fill="hold">
+                            <p:stCondLst>
+                              <p:cond delay="0"/>
+                            </p:stCondLst>
+                            <p:childTnLst>
+                              <p:par>
+                                <p:cTn id="5" presetID="1" presetClass="entr" presetSubtype="0" fill="hold" nodeType="clickEffect">
+                                  <p:stCondLst>
+                                    <p:cond delay="0"/>
+                                  </p:stCondLst>
+                                  <p:childTnLst>
+                                    <p:set>
+                                      <p:cBhvr>
+                                        <p:cTn id="6" dur="1" fill="hold">
+                                          <p:stCondLst>
+                                            <p:cond delay="0"/>
+                                          </p:stCondLst>
+                                        </p:cTn>
+                                        <p:tgtEl>
+                                          <p:spTgt spid="4">
+                                            <p:txEl>
+                                              <p:pRg st="1" end="1"/>
+                                            </p:txEl>
+                                          </p:spTgt>
+                                        </p:tgtEl>
+                                        <p:attrNameLst>
+                                          <p:attrName>style.visibility</p:attrName>
+                                        </p:attrNameLst>
+                                      </p:cBhvr>
+                                      <p:to>
+                                        <p:strVal val="visible"/>
+                                      </p:to>
+                                    </p:set>
+                                  </p:childTnLst>
+                                </p:cTn>
+                              </p:par>
+                            </p:childTnLst>
+                          </p:cTn>
+                        </p:par>
+                      </p:childTnLst>
+                    </p:cTn>
+                  </p:par>
+                  <p:par>
+                    <p:cTn id="7" fill="hold">
+                      <p:stCondLst>
+                        <p:cond delay="indefinite"/>
+                      </p:stCondLst>
+                      <p:childTnLst>
+                        <p:par>
+                          <p:cTn id="8" fill="hold">
+                            <p:stCondLst>
+                              <p:cond delay="0"/>
+                            </p:stCondLst>
+                            <p:childTnLst>
+                              <p:par>
+                                <p:cTn id="9" presetID="1" presetClass="entr" presetSubtype="0" fill="hold" nodeType="clickEffect">
+                                  <p:stCondLst>
+                                    <p:cond delay="0"/>
+                                  </p:stCondLst>
+                                  <p:childTnLst>
+                                    <p:set>
+                                      <p:cBhvr>
+                                        <p:cTn id="10" dur="1" fill="hold">
+                                          <p:stCondLst>
+                                            <p:cond delay="0"/>
+                                          </p:stCondLst>
+                                        </p:cTn>
+                                        <p:tgtEl>
+                                          <p:spTgt spid="4">
+                                            <p:txEl>
+                                              <p:pRg st="2" end="2"/>
+                                            </p:txEl>
+                                          </p:spTgt>
+                                        </p:tgtEl>
+                                        <p:attrNameLst>
+                                          <p:attrName>style.visibility</p:attrName>
+                                        </p:attrNameLst>
+                                      </p:cBhvr>
+                                      <p:to>
+                                        <p:strVal val="visible"/>
+                                      </p:to>
+                                    </p:set>
+                                  </p:childTnLst>
+                                </p:cTn>
+                              </p:par>
+                            </p:childTnLst>
+                          </p:cTn>
+                        </p:par>
+                      </p:childTnLst>
+                    </p:cTn>
+                  </p:par>
+                  <p:par>
+                    <p:cTn id="11" fill="hold">
+                      <p:stCondLst>
+                        <p:cond delay="indefinite"/>
+                      </p:stCondLst>
+                      <p:childTnLst>
+                        <p:par>
+                          <p:cTn id="12" fill="hold">
+                            <p:stCondLst>
+                              <p:cond delay="0"/>
+                            </p:stCondLst>
+                            <p:childTnLst>
+                              <p:par>
+                                <p:cTn id="13" presetID="1" presetClass="entr" presetSubtype="0" fill="hold" nodeType="clickEffect">
+                                  <p:stCondLst>
+                                    <p:cond delay="0"/>
+                                  </p:stCondLst>
+                                  <p:childTnLst>
+                                    <p:set>
+                                      <p:cBhvr>
+                                        <p:cTn id="14" dur="1" fill="hold">
+                                          <p:stCondLst>
+                                            <p:cond delay="0"/>
+                                          </p:stCondLst>
+                                        </p:cTn>
+                                        <p:tgtEl>
+                                          <p:spTgt spid="4">
+                                            <p:txEl>
+                                              <p:pRg st="3" end="3"/>
+                                            </p:txEl>
+                                          </p:spTgt>
+                                        </p:tgtEl>
+                                        <p:attrNameLst>
+                                          <p:attrName>style.visibility</p:attrName>
+                                        </p:attrNameLst>
+                                      </p:cBhvr>
+                                      <p:to>
+                                        <p:strVal val="visible"/>
+                                      </p:to>
+                                    </p:set>
+                                  </p:childTnLst>
+                                </p:cTn>
+                              </p:par>
+                              <p:par>
+                                <p:cTn id="15" presetID="1" presetClass="entr" presetSubtype="0" fill="hold" nodeType="withEffect">
+                                  <p:stCondLst>
+                                    <p:cond delay="0"/>
+                                  </p:stCondLst>
+                                  <p:childTnLst>
+                                    <p:set>
+                                      <p:cBhvr>
+                                        <p:cTn id="16" dur="1" fill="hold">
+                                          <p:stCondLst>
+                                            <p:cond delay="0"/>
+                                          </p:stCondLst>
+                                        </p:cTn>
+                                        <p:tgtEl>
+                                          <p:spTgt spid="6"/>
+                                        </p:tgtEl>
+                                        <p:attrNameLst>
+                                          <p:attrName>style.visibility</p:attrName>
+                                        </p:attrNameLst>
+                                      </p:cBhvr>
+                                      <p:to>
+                                        <p:strVal val="visible"/>
+                                      </p:to>
+                                    </p:set>
+                                  </p:childTnLst>
+                                </p:cTn>
+                              </p:par>
+                            </p:childTnLst>
+                          </p:cTn>
+                        </p:par>
+                      </p:childTnLst>
+                    </p:cTn>
+                  </p:par>
+                </p:childTnLst>
+              </p:cTn>
+              <p:prevCondLst>
+                <p:cond evt="onPrev" delay="0">
+                  <p:tgtEl>
+                    <p:sldTgt/>
+                  </p:tgtEl>
+                </p:cond>
+              </p:prevCondLst>
+              <p:nextCondLst>
+                <p:cond evt="onNext" delay="0">
+                  <p:tgtEl>
+                    <p:sldTgt/>
+                  </p:tgtEl>
+                </p:cond>
+              </p:nextCondLst>
+            </p:seq>
+          </p:childTnLst>
+        </p:cTn>
+      </p:par>
+    </p:tnLst>
+  </p:timing>
 </p:sld>
 </file>
 
@@ -17994,8 +17993,8 @@
           </a:p>
         </p:txBody>
       </p:sp>
-      <mc:AlternateContent xmlns:mc="http://schemas.openxmlformats.org/markup-compatibility/2006" xmlns:a14="http://schemas.microsoft.com/office/drawing/2010/main">
-        <mc:Choice Requires="a14">
+      <mc:AlternateContent xmlns:mc="http://schemas.openxmlformats.org/markup-compatibility/2006">
+        <mc:Choice xmlns:a14="http://schemas.microsoft.com/office/drawing/2010/main" Requires="a14">
           <p:sp>
             <p:nvSpPr>
               <p:cNvPr id="3" name="Content Placeholder 2"/>
@@ -18098,6 +18097,11 @@
                   <a:rPr dirty="0"/>
                   <a:t>Game day, e.g. Supper Bowl</a:t>
                 </a:r>
+                <a:r>
+                  <a:rPr lang="en-US" dirty="0"/>
+                  <a:t> Sunday</a:t>
+                </a:r>
+                <a:endParaRPr dirty="0"/>
               </a:p>
               <a:p>
                 <a:pPr lvl="1"/>
@@ -18137,7 +18141,7 @@
             </p:txBody>
           </p:sp>
         </mc:Choice>
-        <mc:Fallback xmlns="">
+        <mc:Fallback>
           <p:sp>
             <p:nvSpPr>
               <p:cNvPr id="3" name="Content Placeholder 2"/>
@@ -19935,7 +19939,7 @@
         </p:spPr>
         <p:txBody>
           <a:bodyPr>
-            <a:normAutofit lnSpcReduction="10000"/>
+            <a:normAutofit fontScale="92500" lnSpcReduction="10000"/>
           </a:bodyPr>
           <a:lstStyle/>
           <a:p>
@@ -19972,7 +19976,21 @@
           <a:p>
             <a:r>
               <a:rPr lang="en-US" dirty="0"/>
-              <a:t>Find periodic behavior with ACF</a:t>
+              <a:t>Find periodic behavior analytically </a:t>
+            </a:r>
+          </a:p>
+          <a:p>
+            <a:pPr lvl="1"/>
+            <a:r>
+              <a:rPr lang="en-US" dirty="0"/>
+              <a:t>ACF</a:t>
+            </a:r>
+          </a:p>
+          <a:p>
+            <a:pPr lvl="1"/>
+            <a:r>
+              <a:rPr lang="en-US" dirty="0"/>
+              <a:t>Fourier decomposition </a:t>
             </a:r>
           </a:p>
           <a:p>
@@ -20165,33 +20183,15 @@
                                   </p:childTnLst>
                                 </p:cTn>
                               </p:par>
-                            </p:childTnLst>
-                          </p:cTn>
-                        </p:par>
-                      </p:childTnLst>
-                    </p:cTn>
-                  </p:par>
-                  <p:par>
-                    <p:cTn id="15" fill="hold">
-                      <p:stCondLst>
-                        <p:cond delay="indefinite"/>
-                      </p:stCondLst>
-                      <p:childTnLst>
-                        <p:par>
-                          <p:cTn id="16" fill="hold">
-                            <p:stCondLst>
-                              <p:cond delay="0"/>
-                            </p:stCondLst>
-                            <p:childTnLst>
                               <p:par>
-                                <p:cTn id="17" presetID="1" presetClass="entr" presetSubtype="0" fill="hold" nodeType="clickEffect">
+                                <p:cTn id="15" presetID="1" presetClass="entr" presetSubtype="0" fill="hold" nodeType="withEffect">
                                   <p:stCondLst>
                                     <p:cond delay="0"/>
                                   </p:stCondLst>
                                   <p:childTnLst>
                                     <p:set>
                                       <p:cBhvr>
-                                        <p:cTn id="18" dur="1" fill="hold">
+                                        <p:cTn id="16" dur="1" fill="hold">
                                           <p:stCondLst>
                                             <p:cond delay="0"/>
                                           </p:stCondLst>
@@ -20215,14 +20215,14 @@
                                 </p:cTn>
                               </p:par>
                               <p:par>
-                                <p:cTn id="19" presetID="1" presetClass="entr" presetSubtype="0" fill="hold" nodeType="withEffect">
+                                <p:cTn id="17" presetID="1" presetClass="entr" presetSubtype="0" fill="hold" nodeType="withEffect">
                                   <p:stCondLst>
                                     <p:cond delay="0"/>
                                   </p:stCondLst>
                                   <p:childTnLst>
                                     <p:set>
                                       <p:cBhvr>
-                                        <p:cTn id="20" dur="1" fill="hold">
+                                        <p:cTn id="18" dur="1" fill="hold">
                                           <p:stCondLst>
                                             <p:cond delay="0"/>
                                           </p:stCondLst>
@@ -20245,8 +20245,26 @@
                                   </p:childTnLst>
                                 </p:cTn>
                               </p:par>
+                            </p:childTnLst>
+                          </p:cTn>
+                        </p:par>
+                      </p:childTnLst>
+                    </p:cTn>
+                  </p:par>
+                  <p:par>
+                    <p:cTn id="19" fill="hold">
+                      <p:stCondLst>
+                        <p:cond delay="indefinite"/>
+                      </p:stCondLst>
+                      <p:childTnLst>
+                        <p:par>
+                          <p:cTn id="20" fill="hold">
+                            <p:stCondLst>
+                              <p:cond delay="0"/>
+                            </p:stCondLst>
+                            <p:childTnLst>
                               <p:par>
-                                <p:cTn id="21" presetID="1" presetClass="entr" presetSubtype="0" fill="hold" nodeType="withEffect">
+                                <p:cTn id="21" presetID="1" presetClass="entr" presetSubtype="0" fill="hold" nodeType="clickEffect">
                                   <p:stCondLst>
                                     <p:cond delay="0"/>
                                   </p:stCondLst>
@@ -20262,6 +20280,68 @@
                                           <p:spTgt spid="3">
                                             <p:txEl>
                                               <p:pRg st="7" end="7"/>
+                                            </p:txEl>
+                                          </p:spTgt>
+                                        </p:tgtEl>
+                                        <p:attrNameLst>
+                                          <p:attrName>style.visibility</p:attrName>
+                                        </p:attrNameLst>
+                                      </p:cBhvr>
+                                      <p:to>
+                                        <p:strVal val="visible"/>
+                                      </p:to>
+                                    </p:set>
+                                  </p:childTnLst>
+                                </p:cTn>
+                              </p:par>
+                              <p:par>
+                                <p:cTn id="23" presetID="1" presetClass="entr" presetSubtype="0" fill="hold" nodeType="withEffect">
+                                  <p:stCondLst>
+                                    <p:cond delay="0"/>
+                                  </p:stCondLst>
+                                  <p:childTnLst>
+                                    <p:set>
+                                      <p:cBhvr>
+                                        <p:cTn id="24" dur="1" fill="hold">
+                                          <p:stCondLst>
+                                            <p:cond delay="0"/>
+                                          </p:stCondLst>
+                                        </p:cTn>
+                                        <p:tgtEl>
+                                          <p:spTgt spid="3">
+                                            <p:txEl>
+                                              <p:pRg st="8" end="8"/>
+                                            </p:txEl>
+                                          </p:spTgt>
+                                        </p:tgtEl>
+                                        <p:attrNameLst>
+                                          <p:attrName>style.visibility</p:attrName>
+                                        </p:attrNameLst>
+                                      </p:cBhvr>
+                                      <p:to>
+                                        <p:strVal val="visible"/>
+                                      </p:to>
+                                    </p:set>
+                                  </p:childTnLst>
+                                </p:cTn>
+                              </p:par>
+                              <p:par>
+                                <p:cTn id="25" presetID="1" presetClass="entr" presetSubtype="0" fill="hold" nodeType="withEffect">
+                                  <p:stCondLst>
+                                    <p:cond delay="0"/>
+                                  </p:stCondLst>
+                                  <p:childTnLst>
+                                    <p:set>
+                                      <p:cBhvr>
+                                        <p:cTn id="26" dur="1" fill="hold">
+                                          <p:stCondLst>
+                                            <p:cond delay="0"/>
+                                          </p:stCondLst>
+                                        </p:cTn>
+                                        <p:tgtEl>
+                                          <p:spTgt spid="3">
+                                            <p:txEl>
+                                              <p:pRg st="9" end="9"/>
                                             </p:txEl>
                                           </p:spTgt>
                                         </p:tgtEl>
@@ -23818,8 +23898,8 @@
           </a:p>
         </p:txBody>
       </p:sp>
-      <mc:AlternateContent xmlns:mc="http://schemas.openxmlformats.org/markup-compatibility/2006" xmlns:a14="http://schemas.microsoft.com/office/drawing/2010/main">
-        <mc:Choice Requires="a14">
+      <mc:AlternateContent xmlns:mc="http://schemas.openxmlformats.org/markup-compatibility/2006">
+        <mc:Choice xmlns:a14="http://schemas.microsoft.com/office/drawing/2010/main" Requires="a14">
           <p:sp>
             <p:nvSpPr>
               <p:cNvPr id="3" name="Content Placeholder 2"/>
@@ -24042,14 +24122,14 @@
                 </a14:m>
                 <a:r>
                   <a:rPr lang="en-US" dirty="0"/>
-                  <a:t> the time difference</a:t>
+                  <a:t> the time step</a:t>
                 </a:r>
                 <a:endParaRPr dirty="0"/>
               </a:p>
             </p:txBody>
           </p:sp>
         </mc:Choice>
-        <mc:Fallback xmlns="">
+        <mc:Fallback>
           <p:sp>
             <p:nvSpPr>
               <p:cNvPr id="3" name="Content Placeholder 2"/>
@@ -24391,7 +24471,7 @@
             </p:spPr>
             <p:txBody>
               <a:bodyPr>
-                <a:normAutofit fontScale="92500" lnSpcReduction="20000"/>
+                <a:normAutofit fontScale="85000" lnSpcReduction="20000"/>
               </a:bodyPr>
               <a:lstStyle/>
               <a:p>
@@ -24661,6 +24741,13 @@
                 </a:r>
               </a:p>
               <a:p>
+                <a:pPr lvl="1"/>
+                <a:r>
+                  <a:rPr lang="en-US" dirty="0"/>
+                  <a:t>Can be multiple seasonal periods</a:t>
+                </a:r>
+              </a:p>
+              <a:p>
                 <a:r>
                   <a:rPr lang="en-US" dirty="0"/>
                   <a:t>Can combine seasonal and non-seasonal differencing </a:t>
@@ -24906,7 +24993,7 @@
               <a:blipFill>
                 <a:blip r:embed="rId2"/>
                 <a:stretch>
-                  <a:fillRect l="-963" t="-2686"/>
+                  <a:fillRect l="-741" t="-2370"/>
                 </a:stretch>
               </a:blipFill>
             </p:spPr>
@@ -25123,33 +25210,15 @@
                                   </p:childTnLst>
                                 </p:cTn>
                               </p:par>
-                            </p:childTnLst>
-                          </p:cTn>
-                        </p:par>
-                      </p:childTnLst>
-                    </p:cTn>
-                  </p:par>
-                  <p:par>
-                    <p:cTn id="17" fill="hold">
-                      <p:stCondLst>
-                        <p:cond delay="indefinite"/>
-                      </p:stCondLst>
-                      <p:childTnLst>
-                        <p:par>
-                          <p:cTn id="18" fill="hold">
-                            <p:stCondLst>
-                              <p:cond delay="0"/>
-                            </p:stCondLst>
-                            <p:childTnLst>
                               <p:par>
-                                <p:cTn id="19" presetID="1" presetClass="entr" presetSubtype="0" fill="hold" nodeType="clickEffect">
+                                <p:cTn id="17" presetID="1" presetClass="entr" presetSubtype="0" fill="hold" nodeType="withEffect">
                                   <p:stCondLst>
                                     <p:cond delay="0"/>
                                   </p:stCondLst>
                                   <p:childTnLst>
                                     <p:set>
                                       <p:cBhvr>
-                                        <p:cTn id="20" dur="1" fill="hold">
+                                        <p:cTn id="18" dur="1" fill="hold">
                                           <p:stCondLst>
                                             <p:cond delay="0"/>
                                           </p:stCondLst>
@@ -25172,8 +25241,26 @@
                                   </p:childTnLst>
                                 </p:cTn>
                               </p:par>
+                            </p:childTnLst>
+                          </p:cTn>
+                        </p:par>
+                      </p:childTnLst>
+                    </p:cTn>
+                  </p:par>
+                  <p:par>
+                    <p:cTn id="19" fill="hold">
+                      <p:stCondLst>
+                        <p:cond delay="indefinite"/>
+                      </p:stCondLst>
+                      <p:childTnLst>
+                        <p:par>
+                          <p:cTn id="20" fill="hold">
+                            <p:stCondLst>
+                              <p:cond delay="0"/>
+                            </p:stCondLst>
+                            <p:childTnLst>
                               <p:par>
-                                <p:cTn id="21" presetID="1" presetClass="entr" presetSubtype="0" fill="hold" nodeType="withEffect">
+                                <p:cTn id="21" presetID="1" presetClass="entr" presetSubtype="0" fill="hold" nodeType="clickEffect">
                                   <p:stCondLst>
                                     <p:cond delay="0"/>
                                   </p:stCondLst>
@@ -25203,33 +25290,15 @@
                                   </p:childTnLst>
                                 </p:cTn>
                               </p:par>
-                            </p:childTnLst>
-                          </p:cTn>
-                        </p:par>
-                      </p:childTnLst>
-                    </p:cTn>
-                  </p:par>
-                  <p:par>
-                    <p:cTn id="23" fill="hold">
-                      <p:stCondLst>
-                        <p:cond delay="indefinite"/>
-                      </p:stCondLst>
-                      <p:childTnLst>
-                        <p:par>
-                          <p:cTn id="24" fill="hold">
-                            <p:stCondLst>
-                              <p:cond delay="0"/>
-                            </p:stCondLst>
-                            <p:childTnLst>
                               <p:par>
-                                <p:cTn id="25" presetID="1" presetClass="entr" presetSubtype="0" fill="hold" nodeType="clickEffect">
+                                <p:cTn id="23" presetID="1" presetClass="entr" presetSubtype="0" fill="hold" nodeType="withEffect">
                                   <p:stCondLst>
                                     <p:cond delay="0"/>
                                   </p:stCondLst>
                                   <p:childTnLst>
                                     <p:set>
                                       <p:cBhvr>
-                                        <p:cTn id="26" dur="1" fill="hold">
+                                        <p:cTn id="24" dur="1" fill="hold">
                                           <p:stCondLst>
                                             <p:cond delay="0"/>
                                           </p:stCondLst>
@@ -25238,6 +25307,55 @@
                                           <p:spTgt spid="3">
                                             <p:txEl>
                                               <p:pRg st="9" end="9"/>
+                                            </p:txEl>
+                                          </p:spTgt>
+                                        </p:tgtEl>
+                                        <p:attrNameLst>
+                                          <p:attrName>style.visibility</p:attrName>
+                                        </p:attrNameLst>
+                                      </p:cBhvr>
+                                      <p:to>
+                                        <p:strVal val="visible"/>
+                                      </p:to>
+                                    </p:set>
+                                  </p:childTnLst>
+                                </p:cTn>
+                              </p:par>
+                            </p:childTnLst>
+                          </p:cTn>
+                        </p:par>
+                      </p:childTnLst>
+                    </p:cTn>
+                  </p:par>
+                  <p:par>
+                    <p:cTn id="25" fill="hold">
+                      <p:stCondLst>
+                        <p:cond delay="indefinite"/>
+                      </p:stCondLst>
+                      <p:childTnLst>
+                        <p:par>
+                          <p:cTn id="26" fill="hold">
+                            <p:stCondLst>
+                              <p:cond delay="0"/>
+                            </p:stCondLst>
+                            <p:childTnLst>
+                              <p:par>
+                                <p:cTn id="27" presetID="1" presetClass="entr" presetSubtype="0" fill="hold" nodeType="clickEffect">
+                                  <p:stCondLst>
+                                    <p:cond delay="0"/>
+                                  </p:stCondLst>
+                                  <p:childTnLst>
+                                    <p:set>
+                                      <p:cBhvr>
+                                        <p:cTn id="28" dur="1" fill="hold">
+                                          <p:stCondLst>
+                                            <p:cond delay="0"/>
+                                          </p:stCondLst>
+                                        </p:cTn>
+                                        <p:tgtEl>
+                                          <p:spTgt spid="3">
+                                            <p:txEl>
+                                              <p:pRg st="10" end="10"/>
                                             </p:txEl>
                                           </p:spTgt>
                                         </p:tgtEl>
@@ -26684,43 +26802,21 @@
                                   </p:childTnLst>
                                 </p:cTn>
                               </p:par>
-                            </p:childTnLst>
-                          </p:cTn>
-                        </p:par>
-                      </p:childTnLst>
-                    </p:cTn>
-                  </p:par>
-                  <p:par>
-                    <p:cTn id="7" fill="hold">
-                      <p:stCondLst>
-                        <p:cond delay="indefinite"/>
-                      </p:stCondLst>
-                      <p:childTnLst>
-                        <p:par>
-                          <p:cTn id="8" fill="hold">
-                            <p:stCondLst>
-                              <p:cond delay="0"/>
-                            </p:stCondLst>
-                            <p:childTnLst>
                               <p:par>
-                                <p:cTn id="9" presetID="1" presetClass="entr" presetSubtype="0" fill="hold" nodeType="clickEffect">
+                                <p:cTn id="7" presetID="1" presetClass="entr" presetSubtype="0" fill="hold" nodeType="withEffect">
                                   <p:stCondLst>
                                     <p:cond delay="0"/>
                                   </p:stCondLst>
                                   <p:childTnLst>
                                     <p:set>
                                       <p:cBhvr>
-                                        <p:cTn id="10" dur="1" fill="hold">
+                                        <p:cTn id="8" dur="1" fill="hold">
                                           <p:stCondLst>
                                             <p:cond delay="0"/>
                                           </p:stCondLst>
                                         </p:cTn>
                                         <p:tgtEl>
-                                          <p:spTgt spid="4">
-                                            <p:txEl>
-                                              <p:pRg st="2" end="2"/>
-                                            </p:txEl>
-                                          </p:spTgt>
+                                          <p:spTgt spid="6"/>
                                         </p:tgtEl>
                                         <p:attrNameLst>
                                           <p:attrName>style.visibility</p:attrName>
@@ -26733,8 +26829,26 @@
                                   </p:childTnLst>
                                 </p:cTn>
                               </p:par>
+                            </p:childTnLst>
+                          </p:cTn>
+                        </p:par>
+                      </p:childTnLst>
+                    </p:cTn>
+                  </p:par>
+                  <p:par>
+                    <p:cTn id="9" fill="hold">
+                      <p:stCondLst>
+                        <p:cond delay="indefinite"/>
+                      </p:stCondLst>
+                      <p:childTnLst>
+                        <p:par>
+                          <p:cTn id="10" fill="hold">
+                            <p:stCondLst>
+                              <p:cond delay="0"/>
+                            </p:stCondLst>
+                            <p:childTnLst>
                               <p:par>
-                                <p:cTn id="11" presetID="1" presetClass="entr" presetSubtype="0" fill="hold" nodeType="withEffect">
+                                <p:cTn id="11" presetID="1" presetClass="entr" presetSubtype="0" fill="hold" nodeType="clickEffect">
                                   <p:stCondLst>
                                     <p:cond delay="0"/>
                                   </p:stCondLst>
@@ -26747,7 +26861,11 @@
                                           </p:stCondLst>
                                         </p:cTn>
                                         <p:tgtEl>
-                                          <p:spTgt spid="6"/>
+                                          <p:spTgt spid="4">
+                                            <p:txEl>
+                                              <p:pRg st="2" end="2"/>
+                                            </p:txEl>
+                                          </p:spTgt>
                                         </p:tgtEl>
                                         <p:attrNameLst>
                                           <p:attrName>style.visibility</p:attrName>
@@ -27328,8 +27446,8 @@
           </a:p>
         </p:txBody>
       </p:sp>
-      <mc:AlternateContent xmlns:mc="http://schemas.openxmlformats.org/markup-compatibility/2006">
-        <mc:Choice xmlns:a14="http://schemas.microsoft.com/office/drawing/2010/main" Requires="a14">
+      <mc:AlternateContent xmlns:mc="http://schemas.openxmlformats.org/markup-compatibility/2006" xmlns:a14="http://schemas.microsoft.com/office/drawing/2010/main">
+        <mc:Choice Requires="a14">
           <p:sp>
             <p:nvSpPr>
               <p:cNvPr id="3" name="Content Placeholder 2">
@@ -28159,7 +28277,7 @@
             </p:txBody>
           </p:sp>
         </mc:Choice>
-        <mc:Fallback>
+        <mc:Fallback xmlns="">
           <p:sp>
             <p:nvSpPr>
               <p:cNvPr id="3" name="Content Placeholder 2">
@@ -29000,8 +29118,8 @@
           </a:p>
         </p:txBody>
       </p:sp>
-      <mc:AlternateContent xmlns:mc="http://schemas.openxmlformats.org/markup-compatibility/2006">
-        <mc:Choice xmlns:a14="http://schemas.microsoft.com/office/drawing/2010/main" Requires="a14">
+      <mc:AlternateContent xmlns:mc="http://schemas.openxmlformats.org/markup-compatibility/2006" xmlns:a14="http://schemas.microsoft.com/office/drawing/2010/main">
+        <mc:Choice Requires="a14">
           <p:sp>
             <p:nvSpPr>
               <p:cNvPr id="3" name="Content Placeholder 2"/>
@@ -29632,7 +29750,7 @@
             </p:txBody>
           </p:sp>
         </mc:Choice>
-        <mc:Fallback>
+        <mc:Fallback xmlns="">
           <p:sp>
             <p:nvSpPr>
               <p:cNvPr id="3" name="Content Placeholder 2"/>
@@ -30291,8 +30409,8 @@
           </a:p>
         </p:txBody>
       </p:sp>
-      <mc:AlternateContent xmlns:mc="http://schemas.openxmlformats.org/markup-compatibility/2006">
-        <mc:Choice xmlns:a14="http://schemas.microsoft.com/office/drawing/2010/main" Requires="a14">
+      <mc:AlternateContent xmlns:mc="http://schemas.openxmlformats.org/markup-compatibility/2006" xmlns:a14="http://schemas.microsoft.com/office/drawing/2010/main">
+        <mc:Choice Requires="a14">
           <p:sp>
             <p:nvSpPr>
               <p:cNvPr id="3" name="Content Placeholder 2"/>
@@ -30821,7 +30939,7 @@
             </p:txBody>
           </p:sp>
         </mc:Choice>
-        <mc:Fallback>
+        <mc:Fallback xmlns="">
           <p:sp>
             <p:nvSpPr>
               <p:cNvPr id="3" name="Content Placeholder 2"/>
@@ -31116,8 +31234,8 @@
           </a:p>
         </p:txBody>
       </p:sp>
-      <mc:AlternateContent xmlns:mc="http://schemas.openxmlformats.org/markup-compatibility/2006">
-        <mc:Choice xmlns:a14="http://schemas.microsoft.com/office/drawing/2010/main" Requires="a14">
+      <mc:AlternateContent xmlns:mc="http://schemas.openxmlformats.org/markup-compatibility/2006" xmlns:a14="http://schemas.microsoft.com/office/drawing/2010/main">
+        <mc:Choice Requires="a14">
           <p:sp>
             <p:nvSpPr>
               <p:cNvPr id="3" name="Content Placeholder 2"/>
@@ -31291,7 +31409,7 @@
             </p:txBody>
           </p:sp>
         </mc:Choice>
-        <mc:Fallback>
+        <mc:Fallback xmlns="">
           <p:sp>
             <p:nvSpPr>
               <p:cNvPr id="3" name="Content Placeholder 2"/>
@@ -31374,8 +31492,8 @@
           </a:p>
         </p:txBody>
       </p:sp>
-      <mc:AlternateContent xmlns:mc="http://schemas.openxmlformats.org/markup-compatibility/2006">
-        <mc:Choice xmlns:a14="http://schemas.microsoft.com/office/drawing/2010/main" Requires="a14">
+      <mc:AlternateContent xmlns:mc="http://schemas.openxmlformats.org/markup-compatibility/2006" xmlns:a14="http://schemas.microsoft.com/office/drawing/2010/main">
+        <mc:Choice Requires="a14">
           <p:sp>
             <p:nvSpPr>
               <p:cNvPr id="3" name="Content Placeholder 2"/>
@@ -32046,7 +32164,7 @@
             </p:txBody>
           </p:sp>
         </mc:Choice>
-        <mc:Fallback>
+        <mc:Fallback xmlns="">
           <p:sp>
             <p:nvSpPr>
               <p:cNvPr id="3" name="Content Placeholder 2"/>
@@ -38723,6 +38841,183 @@
   <p:clrMapOvr>
     <a:masterClrMapping/>
   </p:clrMapOvr>
+  <p:timing>
+    <p:tnLst>
+      <p:par>
+        <p:cTn id="1" dur="indefinite" restart="never" nodeType="tmRoot">
+          <p:childTnLst>
+            <p:seq concurrent="1" nextAc="seek">
+              <p:cTn id="2" dur="indefinite" nodeType="mainSeq">
+                <p:childTnLst>
+                  <p:par>
+                    <p:cTn id="3" fill="hold">
+                      <p:stCondLst>
+                        <p:cond delay="indefinite"/>
+                      </p:stCondLst>
+                      <p:childTnLst>
+                        <p:par>
+                          <p:cTn id="4" fill="hold">
+                            <p:stCondLst>
+                              <p:cond delay="0"/>
+                            </p:stCondLst>
+                            <p:childTnLst>
+                              <p:par>
+                                <p:cTn id="5" presetID="1" presetClass="entr" presetSubtype="0" fill="hold" nodeType="clickEffect">
+                                  <p:stCondLst>
+                                    <p:cond delay="0"/>
+                                  </p:stCondLst>
+                                  <p:childTnLst>
+                                    <p:set>
+                                      <p:cBhvr>
+                                        <p:cTn id="6" dur="1" fill="hold">
+                                          <p:stCondLst>
+                                            <p:cond delay="0"/>
+                                          </p:stCondLst>
+                                        </p:cTn>
+                                        <p:tgtEl>
+                                          <p:spTgt spid="3">
+                                            <p:txEl>
+                                              <p:pRg st="1" end="1"/>
+                                            </p:txEl>
+                                          </p:spTgt>
+                                        </p:tgtEl>
+                                        <p:attrNameLst>
+                                          <p:attrName>style.visibility</p:attrName>
+                                        </p:attrNameLst>
+                                      </p:cBhvr>
+                                      <p:to>
+                                        <p:strVal val="visible"/>
+                                      </p:to>
+                                    </p:set>
+                                  </p:childTnLst>
+                                </p:cTn>
+                              </p:par>
+                            </p:childTnLst>
+                          </p:cTn>
+                        </p:par>
+                      </p:childTnLst>
+                    </p:cTn>
+                  </p:par>
+                  <p:par>
+                    <p:cTn id="7" fill="hold">
+                      <p:stCondLst>
+                        <p:cond delay="indefinite"/>
+                      </p:stCondLst>
+                      <p:childTnLst>
+                        <p:par>
+                          <p:cTn id="8" fill="hold">
+                            <p:stCondLst>
+                              <p:cond delay="0"/>
+                            </p:stCondLst>
+                            <p:childTnLst>
+                              <p:par>
+                                <p:cTn id="9" presetID="1" presetClass="entr" presetSubtype="0" fill="hold" nodeType="clickEffect">
+                                  <p:stCondLst>
+                                    <p:cond delay="0"/>
+                                  </p:stCondLst>
+                                  <p:childTnLst>
+                                    <p:set>
+                                      <p:cBhvr>
+                                        <p:cTn id="10" dur="1" fill="hold">
+                                          <p:stCondLst>
+                                            <p:cond delay="0"/>
+                                          </p:stCondLst>
+                                        </p:cTn>
+                                        <p:tgtEl>
+                                          <p:spTgt spid="3">
+                                            <p:txEl>
+                                              <p:pRg st="2" end="2"/>
+                                            </p:txEl>
+                                          </p:spTgt>
+                                        </p:tgtEl>
+                                        <p:attrNameLst>
+                                          <p:attrName>style.visibility</p:attrName>
+                                        </p:attrNameLst>
+                                      </p:cBhvr>
+                                      <p:to>
+                                        <p:strVal val="visible"/>
+                                      </p:to>
+                                    </p:set>
+                                  </p:childTnLst>
+                                </p:cTn>
+                              </p:par>
+                            </p:childTnLst>
+                          </p:cTn>
+                        </p:par>
+                      </p:childTnLst>
+                    </p:cTn>
+                  </p:par>
+                  <p:par>
+                    <p:cTn id="11" fill="hold">
+                      <p:stCondLst>
+                        <p:cond delay="indefinite"/>
+                      </p:stCondLst>
+                      <p:childTnLst>
+                        <p:par>
+                          <p:cTn id="12" fill="hold">
+                            <p:stCondLst>
+                              <p:cond delay="0"/>
+                            </p:stCondLst>
+                            <p:childTnLst>
+                              <p:par>
+                                <p:cTn id="13" presetID="1" presetClass="entr" presetSubtype="0" fill="hold" nodeType="clickEffect">
+                                  <p:stCondLst>
+                                    <p:cond delay="0"/>
+                                  </p:stCondLst>
+                                  <p:childTnLst>
+                                    <p:set>
+                                      <p:cBhvr>
+                                        <p:cTn id="14" dur="1" fill="hold">
+                                          <p:stCondLst>
+                                            <p:cond delay="0"/>
+                                          </p:stCondLst>
+                                        </p:cTn>
+                                        <p:tgtEl>
+                                          <p:spTgt spid="3">
+                                            <p:txEl>
+                                              <p:pRg st="3" end="3"/>
+                                            </p:txEl>
+                                          </p:spTgt>
+                                        </p:tgtEl>
+                                        <p:attrNameLst>
+                                          <p:attrName>style.visibility</p:attrName>
+                                        </p:attrNameLst>
+                                      </p:cBhvr>
+                                      <p:to>
+                                        <p:strVal val="visible"/>
+                                      </p:to>
+                                    </p:set>
+                                  </p:childTnLst>
+                                </p:cTn>
+                              </p:par>
+                            </p:childTnLst>
+                          </p:cTn>
+                        </p:par>
+                      </p:childTnLst>
+                    </p:cTn>
+                  </p:par>
+                </p:childTnLst>
+              </p:cTn>
+              <p:prevCondLst>
+                <p:cond evt="onPrev" delay="0">
+                  <p:tgtEl>
+                    <p:sldTgt/>
+                  </p:tgtEl>
+                </p:cond>
+              </p:prevCondLst>
+              <p:nextCondLst>
+                <p:cond evt="onNext" delay="0">
+                  <p:tgtEl>
+                    <p:sldTgt/>
+                  </p:tgtEl>
+                </p:cond>
+              </p:nextCondLst>
+            </p:seq>
+          </p:childTnLst>
+        </p:cTn>
+      </p:par>
+    </p:tnLst>
+  </p:timing>
 </p:sld>
 </file>
 

</xml_diff>